<commit_message>
add my second slide
</commit_message>
<xml_diff>
--- a/DFS Installation  and configuration.pptx
+++ b/DFS Installation  and configuration.pptx
@@ -7,12 +7,13 @@
     <p:sldMasterId id="2147483674" r:id="rId3"/>
   </p:sldMasterIdLst>
   <p:notesMasterIdLst>
-    <p:notesMasterId r:id="rId7"/>
+    <p:notesMasterId r:id="rId8"/>
   </p:notesMasterIdLst>
   <p:sldIdLst>
     <p:sldId id="256" r:id="rId4"/>
     <p:sldId id="257" r:id="rId5"/>
     <p:sldId id="273" r:id="rId6"/>
+    <p:sldId id="292" r:id="rId7"/>
   </p:sldIdLst>
   <p:sldSz cx="12192000" cy="6858000"/>
   <p:notesSz cx="7559675" cy="10691813"/>
@@ -111,6 +112,11 @@
       </a:defRPr>
     </a:lvl9pPr>
   </p:defaultTextStyle>
+  <p:extLst>
+    <p:ext uri="{EFAFB233-063F-42B5-8137-9DF3F51BA10A}">
+      <p15:sldGuideLst xmlns:p15="http://schemas.microsoft.com/office/powerpoint/2012/main"/>
+    </p:ext>
+  </p:extLst>
 </p:presentation>
 </file>
 
@@ -1000,6 +1006,753 @@
     <dgm:fillClrLst meth="repeat">
       <a:schemeClr val="accent2">
         <a:tint val="40000"/>
+      </a:schemeClr>
+    </dgm:fillClrLst>
+    <dgm:linClrLst meth="repeat">
+      <a:schemeClr val="lt1"/>
+    </dgm:linClrLst>
+    <dgm:effectClrLst/>
+    <dgm:txLinClrLst/>
+    <dgm:txFillClrLst meth="repeat">
+      <a:schemeClr val="dk1"/>
+    </dgm:txFillClrLst>
+    <dgm:txEffectClrLst/>
+  </dgm:styleLbl>
+  <dgm:styleLbl name="revTx">
+    <dgm:fillClrLst meth="repeat">
+      <a:schemeClr val="lt1">
+        <a:alpha val="0"/>
+      </a:schemeClr>
+    </dgm:fillClrLst>
+    <dgm:linClrLst meth="repeat">
+      <a:schemeClr val="dk1">
+        <a:alpha val="0"/>
+      </a:schemeClr>
+    </dgm:linClrLst>
+    <dgm:effectClrLst/>
+    <dgm:txLinClrLst/>
+    <dgm:txFillClrLst meth="repeat">
+      <a:schemeClr val="tx1"/>
+    </dgm:txFillClrLst>
+    <dgm:txEffectClrLst/>
+  </dgm:styleLbl>
+</dgm:colorsDef>
+</file>
+
+<file path=ppt/diagrams/colors2.xml><?xml version="1.0" encoding="utf-8"?>
+<dgm:colorsDef xmlns:dgm="http://schemas.openxmlformats.org/drawingml/2006/diagram" xmlns:a="http://schemas.openxmlformats.org/drawingml/2006/main" uniqueId="urn:microsoft.com/office/officeart/2005/8/colors/accent5_2">
+  <dgm:title val=""/>
+  <dgm:desc val=""/>
+  <dgm:catLst>
+    <dgm:cat type="accent5" pri="11200"/>
+  </dgm:catLst>
+  <dgm:styleLbl name="node0">
+    <dgm:fillClrLst meth="repeat">
+      <a:schemeClr val="accent5"/>
+    </dgm:fillClrLst>
+    <dgm:linClrLst meth="repeat">
+      <a:schemeClr val="lt1"/>
+    </dgm:linClrLst>
+    <dgm:effectClrLst/>
+    <dgm:txLinClrLst/>
+    <dgm:txFillClrLst/>
+    <dgm:txEffectClrLst/>
+  </dgm:styleLbl>
+  <dgm:styleLbl name="node1">
+    <dgm:fillClrLst meth="repeat">
+      <a:schemeClr val="accent5"/>
+    </dgm:fillClrLst>
+    <dgm:linClrLst meth="repeat">
+      <a:schemeClr val="lt1"/>
+    </dgm:linClrLst>
+    <dgm:effectClrLst/>
+    <dgm:txLinClrLst/>
+    <dgm:txFillClrLst/>
+    <dgm:txEffectClrLst/>
+  </dgm:styleLbl>
+  <dgm:styleLbl name="alignNode1">
+    <dgm:fillClrLst meth="repeat">
+      <a:schemeClr val="accent5"/>
+    </dgm:fillClrLst>
+    <dgm:linClrLst meth="repeat">
+      <a:schemeClr val="accent5"/>
+    </dgm:linClrLst>
+    <dgm:effectClrLst/>
+    <dgm:txLinClrLst/>
+    <dgm:txFillClrLst/>
+    <dgm:txEffectClrLst/>
+  </dgm:styleLbl>
+  <dgm:styleLbl name="lnNode1">
+    <dgm:fillClrLst meth="repeat">
+      <a:schemeClr val="accent5"/>
+    </dgm:fillClrLst>
+    <dgm:linClrLst meth="repeat">
+      <a:schemeClr val="lt1"/>
+    </dgm:linClrLst>
+    <dgm:effectClrLst/>
+    <dgm:txLinClrLst/>
+    <dgm:txFillClrLst/>
+    <dgm:txEffectClrLst/>
+  </dgm:styleLbl>
+  <dgm:styleLbl name="vennNode1">
+    <dgm:fillClrLst meth="repeat">
+      <a:schemeClr val="accent5">
+        <a:alpha val="50000"/>
+      </a:schemeClr>
+    </dgm:fillClrLst>
+    <dgm:linClrLst meth="repeat">
+      <a:schemeClr val="lt1"/>
+    </dgm:linClrLst>
+    <dgm:effectClrLst/>
+    <dgm:txLinClrLst/>
+    <dgm:txFillClrLst/>
+    <dgm:txEffectClrLst/>
+  </dgm:styleLbl>
+  <dgm:styleLbl name="node2">
+    <dgm:fillClrLst meth="repeat">
+      <a:schemeClr val="accent5"/>
+    </dgm:fillClrLst>
+    <dgm:linClrLst meth="repeat">
+      <a:schemeClr val="lt1"/>
+    </dgm:linClrLst>
+    <dgm:effectClrLst/>
+    <dgm:txLinClrLst/>
+    <dgm:txFillClrLst/>
+    <dgm:txEffectClrLst/>
+  </dgm:styleLbl>
+  <dgm:styleLbl name="node3">
+    <dgm:fillClrLst meth="repeat">
+      <a:schemeClr val="accent5"/>
+    </dgm:fillClrLst>
+    <dgm:linClrLst meth="repeat">
+      <a:schemeClr val="lt1"/>
+    </dgm:linClrLst>
+    <dgm:effectClrLst/>
+    <dgm:txLinClrLst/>
+    <dgm:txFillClrLst/>
+    <dgm:txEffectClrLst/>
+  </dgm:styleLbl>
+  <dgm:styleLbl name="node4">
+    <dgm:fillClrLst meth="repeat">
+      <a:schemeClr val="accent5"/>
+    </dgm:fillClrLst>
+    <dgm:linClrLst meth="repeat">
+      <a:schemeClr val="lt1"/>
+    </dgm:linClrLst>
+    <dgm:effectClrLst/>
+    <dgm:txLinClrLst/>
+    <dgm:txFillClrLst/>
+    <dgm:txEffectClrLst/>
+  </dgm:styleLbl>
+  <dgm:styleLbl name="fgImgPlace1">
+    <dgm:fillClrLst meth="repeat">
+      <a:schemeClr val="accent5">
+        <a:tint val="50000"/>
+      </a:schemeClr>
+    </dgm:fillClrLst>
+    <dgm:linClrLst meth="repeat">
+      <a:schemeClr val="lt1"/>
+    </dgm:linClrLst>
+    <dgm:effectClrLst/>
+    <dgm:txLinClrLst/>
+    <dgm:txFillClrLst meth="repeat">
+      <a:schemeClr val="lt1"/>
+    </dgm:txFillClrLst>
+    <dgm:txEffectClrLst/>
+  </dgm:styleLbl>
+  <dgm:styleLbl name="alignImgPlace1">
+    <dgm:fillClrLst meth="repeat">
+      <a:schemeClr val="accent5">
+        <a:tint val="50000"/>
+      </a:schemeClr>
+    </dgm:fillClrLst>
+    <dgm:linClrLst meth="repeat">
+      <a:schemeClr val="lt1"/>
+    </dgm:linClrLst>
+    <dgm:effectClrLst/>
+    <dgm:txLinClrLst/>
+    <dgm:txFillClrLst meth="repeat">
+      <a:schemeClr val="lt1"/>
+    </dgm:txFillClrLst>
+    <dgm:txEffectClrLst/>
+  </dgm:styleLbl>
+  <dgm:styleLbl name="bgImgPlace1">
+    <dgm:fillClrLst meth="repeat">
+      <a:schemeClr val="accent5">
+        <a:tint val="50000"/>
+      </a:schemeClr>
+    </dgm:fillClrLst>
+    <dgm:linClrLst meth="repeat">
+      <a:schemeClr val="lt1"/>
+    </dgm:linClrLst>
+    <dgm:effectClrLst/>
+    <dgm:txLinClrLst/>
+    <dgm:txFillClrLst meth="repeat">
+      <a:schemeClr val="lt1"/>
+    </dgm:txFillClrLst>
+    <dgm:txEffectClrLst/>
+  </dgm:styleLbl>
+  <dgm:styleLbl name="sibTrans2D1">
+    <dgm:fillClrLst meth="repeat">
+      <a:schemeClr val="accent5">
+        <a:tint val="60000"/>
+      </a:schemeClr>
+    </dgm:fillClrLst>
+    <dgm:linClrLst meth="repeat">
+      <a:schemeClr val="accent5">
+        <a:tint val="60000"/>
+      </a:schemeClr>
+    </dgm:linClrLst>
+    <dgm:effectClrLst/>
+    <dgm:txLinClrLst/>
+    <dgm:txFillClrLst/>
+    <dgm:txEffectClrLst/>
+  </dgm:styleLbl>
+  <dgm:styleLbl name="fgSibTrans2D1">
+    <dgm:fillClrLst meth="repeat">
+      <a:schemeClr val="accent5">
+        <a:tint val="60000"/>
+      </a:schemeClr>
+    </dgm:fillClrLst>
+    <dgm:linClrLst meth="repeat">
+      <a:schemeClr val="accent5">
+        <a:tint val="60000"/>
+      </a:schemeClr>
+    </dgm:linClrLst>
+    <dgm:effectClrLst/>
+    <dgm:txLinClrLst/>
+    <dgm:txFillClrLst/>
+    <dgm:txEffectClrLst/>
+  </dgm:styleLbl>
+  <dgm:styleLbl name="bgSibTrans2D1">
+    <dgm:fillClrLst meth="repeat">
+      <a:schemeClr val="accent5">
+        <a:tint val="60000"/>
+      </a:schemeClr>
+    </dgm:fillClrLst>
+    <dgm:linClrLst meth="repeat">
+      <a:schemeClr val="accent5">
+        <a:tint val="60000"/>
+      </a:schemeClr>
+    </dgm:linClrLst>
+    <dgm:effectClrLst/>
+    <dgm:txLinClrLst/>
+    <dgm:txFillClrLst/>
+    <dgm:txEffectClrLst/>
+  </dgm:styleLbl>
+  <dgm:styleLbl name="sibTrans1D1">
+    <dgm:fillClrLst meth="repeat">
+      <a:schemeClr val="accent5"/>
+    </dgm:fillClrLst>
+    <dgm:linClrLst meth="repeat">
+      <a:schemeClr val="accent5"/>
+    </dgm:linClrLst>
+    <dgm:effectClrLst/>
+    <dgm:txLinClrLst/>
+    <dgm:txFillClrLst meth="repeat">
+      <a:schemeClr val="tx1"/>
+    </dgm:txFillClrLst>
+    <dgm:txEffectClrLst/>
+  </dgm:styleLbl>
+  <dgm:styleLbl name="callout">
+    <dgm:fillClrLst meth="repeat">
+      <a:schemeClr val="accent5"/>
+    </dgm:fillClrLst>
+    <dgm:linClrLst meth="repeat">
+      <a:schemeClr val="accent5">
+        <a:tint val="50000"/>
+      </a:schemeClr>
+    </dgm:linClrLst>
+    <dgm:effectClrLst/>
+    <dgm:txLinClrLst/>
+    <dgm:txFillClrLst meth="repeat">
+      <a:schemeClr val="tx1"/>
+    </dgm:txFillClrLst>
+    <dgm:txEffectClrLst/>
+  </dgm:styleLbl>
+  <dgm:styleLbl name="asst0">
+    <dgm:fillClrLst meth="repeat">
+      <a:schemeClr val="accent5"/>
+    </dgm:fillClrLst>
+    <dgm:linClrLst meth="repeat">
+      <a:schemeClr val="lt1"/>
+    </dgm:linClrLst>
+    <dgm:effectClrLst/>
+    <dgm:txLinClrLst/>
+    <dgm:txFillClrLst/>
+    <dgm:txEffectClrLst/>
+  </dgm:styleLbl>
+  <dgm:styleLbl name="asst1">
+    <dgm:fillClrLst meth="repeat">
+      <a:schemeClr val="accent5"/>
+    </dgm:fillClrLst>
+    <dgm:linClrLst meth="repeat">
+      <a:schemeClr val="lt1"/>
+    </dgm:linClrLst>
+    <dgm:effectClrLst/>
+    <dgm:txLinClrLst/>
+    <dgm:txFillClrLst/>
+    <dgm:txEffectClrLst/>
+  </dgm:styleLbl>
+  <dgm:styleLbl name="asst2">
+    <dgm:fillClrLst meth="repeat">
+      <a:schemeClr val="accent5"/>
+    </dgm:fillClrLst>
+    <dgm:linClrLst meth="repeat">
+      <a:schemeClr val="lt1"/>
+    </dgm:linClrLst>
+    <dgm:effectClrLst/>
+    <dgm:txLinClrLst/>
+    <dgm:txFillClrLst/>
+    <dgm:txEffectClrLst/>
+  </dgm:styleLbl>
+  <dgm:styleLbl name="asst3">
+    <dgm:fillClrLst meth="repeat">
+      <a:schemeClr val="accent5"/>
+    </dgm:fillClrLst>
+    <dgm:linClrLst meth="repeat">
+      <a:schemeClr val="lt1"/>
+    </dgm:linClrLst>
+    <dgm:effectClrLst/>
+    <dgm:txLinClrLst/>
+    <dgm:txFillClrLst/>
+    <dgm:txEffectClrLst/>
+  </dgm:styleLbl>
+  <dgm:styleLbl name="asst4">
+    <dgm:fillClrLst meth="repeat">
+      <a:schemeClr val="accent5"/>
+    </dgm:fillClrLst>
+    <dgm:linClrLst meth="repeat">
+      <a:schemeClr val="lt1"/>
+    </dgm:linClrLst>
+    <dgm:effectClrLst/>
+    <dgm:txLinClrLst/>
+    <dgm:txFillClrLst/>
+    <dgm:txEffectClrLst/>
+  </dgm:styleLbl>
+  <dgm:styleLbl name="parChTrans2D1">
+    <dgm:fillClrLst meth="repeat">
+      <a:schemeClr val="accent5">
+        <a:tint val="60000"/>
+      </a:schemeClr>
+    </dgm:fillClrLst>
+    <dgm:linClrLst meth="repeat">
+      <a:schemeClr val="accent5">
+        <a:tint val="60000"/>
+      </a:schemeClr>
+    </dgm:linClrLst>
+    <dgm:effectClrLst/>
+    <dgm:txLinClrLst/>
+    <dgm:txFillClrLst meth="repeat">
+      <a:schemeClr val="lt1"/>
+    </dgm:txFillClrLst>
+    <dgm:txEffectClrLst/>
+  </dgm:styleLbl>
+  <dgm:styleLbl name="parChTrans2D2">
+    <dgm:fillClrLst meth="repeat">
+      <a:schemeClr val="accent5"/>
+    </dgm:fillClrLst>
+    <dgm:linClrLst meth="repeat">
+      <a:schemeClr val="accent5"/>
+    </dgm:linClrLst>
+    <dgm:effectClrLst/>
+    <dgm:txLinClrLst/>
+    <dgm:txFillClrLst meth="repeat">
+      <a:schemeClr val="lt1"/>
+    </dgm:txFillClrLst>
+    <dgm:txEffectClrLst/>
+  </dgm:styleLbl>
+  <dgm:styleLbl name="parChTrans2D3">
+    <dgm:fillClrLst meth="repeat">
+      <a:schemeClr val="accent5"/>
+    </dgm:fillClrLst>
+    <dgm:linClrLst meth="repeat">
+      <a:schemeClr val="accent5"/>
+    </dgm:linClrLst>
+    <dgm:effectClrLst/>
+    <dgm:txLinClrLst/>
+    <dgm:txFillClrLst meth="repeat">
+      <a:schemeClr val="lt1"/>
+    </dgm:txFillClrLst>
+    <dgm:txEffectClrLst/>
+  </dgm:styleLbl>
+  <dgm:styleLbl name="parChTrans2D4">
+    <dgm:fillClrLst meth="repeat">
+      <a:schemeClr val="accent5"/>
+    </dgm:fillClrLst>
+    <dgm:linClrLst meth="repeat">
+      <a:schemeClr val="accent5"/>
+    </dgm:linClrLst>
+    <dgm:effectClrLst/>
+    <dgm:txLinClrLst/>
+    <dgm:txFillClrLst meth="repeat">
+      <a:schemeClr val="lt1"/>
+    </dgm:txFillClrLst>
+    <dgm:txEffectClrLst/>
+  </dgm:styleLbl>
+  <dgm:styleLbl name="parChTrans1D1">
+    <dgm:fillClrLst meth="repeat">
+      <a:schemeClr val="accent5"/>
+    </dgm:fillClrLst>
+    <dgm:linClrLst meth="repeat">
+      <a:schemeClr val="accent5">
+        <a:shade val="60000"/>
+      </a:schemeClr>
+    </dgm:linClrLst>
+    <dgm:effectClrLst/>
+    <dgm:txLinClrLst/>
+    <dgm:txFillClrLst meth="repeat">
+      <a:schemeClr val="tx1"/>
+    </dgm:txFillClrLst>
+    <dgm:txEffectClrLst/>
+  </dgm:styleLbl>
+  <dgm:styleLbl name="parChTrans1D2">
+    <dgm:fillClrLst meth="repeat">
+      <a:schemeClr val="accent5"/>
+    </dgm:fillClrLst>
+    <dgm:linClrLst meth="repeat">
+      <a:schemeClr val="accent5">
+        <a:shade val="60000"/>
+      </a:schemeClr>
+    </dgm:linClrLst>
+    <dgm:effectClrLst/>
+    <dgm:txLinClrLst/>
+    <dgm:txFillClrLst meth="repeat">
+      <a:schemeClr val="tx1"/>
+    </dgm:txFillClrLst>
+    <dgm:txEffectClrLst/>
+  </dgm:styleLbl>
+  <dgm:styleLbl name="parChTrans1D3">
+    <dgm:fillClrLst meth="repeat">
+      <a:schemeClr val="accent5"/>
+    </dgm:fillClrLst>
+    <dgm:linClrLst meth="repeat">
+      <a:schemeClr val="accent5">
+        <a:shade val="80000"/>
+      </a:schemeClr>
+    </dgm:linClrLst>
+    <dgm:effectClrLst/>
+    <dgm:txLinClrLst/>
+    <dgm:txFillClrLst meth="repeat">
+      <a:schemeClr val="tx1"/>
+    </dgm:txFillClrLst>
+    <dgm:txEffectClrLst/>
+  </dgm:styleLbl>
+  <dgm:styleLbl name="parChTrans1D4">
+    <dgm:fillClrLst meth="repeat">
+      <a:schemeClr val="accent5"/>
+    </dgm:fillClrLst>
+    <dgm:linClrLst meth="repeat">
+      <a:schemeClr val="accent5">
+        <a:shade val="80000"/>
+      </a:schemeClr>
+    </dgm:linClrLst>
+    <dgm:effectClrLst/>
+    <dgm:txLinClrLst/>
+    <dgm:txFillClrLst meth="repeat">
+      <a:schemeClr val="tx1"/>
+    </dgm:txFillClrLst>
+    <dgm:txEffectClrLst/>
+  </dgm:styleLbl>
+  <dgm:styleLbl name="fgAcc1">
+    <dgm:fillClrLst meth="repeat">
+      <a:schemeClr val="lt1">
+        <a:alpha val="90000"/>
+      </a:schemeClr>
+    </dgm:fillClrLst>
+    <dgm:linClrLst meth="repeat">
+      <a:schemeClr val="accent5"/>
+    </dgm:linClrLst>
+    <dgm:effectClrLst/>
+    <dgm:txLinClrLst/>
+    <dgm:txFillClrLst meth="repeat">
+      <a:schemeClr val="dk1"/>
+    </dgm:txFillClrLst>
+    <dgm:txEffectClrLst/>
+  </dgm:styleLbl>
+  <dgm:styleLbl name="conFgAcc1">
+    <dgm:fillClrLst meth="repeat">
+      <a:schemeClr val="lt1">
+        <a:alpha val="90000"/>
+      </a:schemeClr>
+    </dgm:fillClrLst>
+    <dgm:linClrLst meth="repeat">
+      <a:schemeClr val="accent5"/>
+    </dgm:linClrLst>
+    <dgm:effectClrLst/>
+    <dgm:txLinClrLst/>
+    <dgm:txFillClrLst meth="repeat">
+      <a:schemeClr val="dk1"/>
+    </dgm:txFillClrLst>
+    <dgm:txEffectClrLst/>
+  </dgm:styleLbl>
+  <dgm:styleLbl name="alignAcc1">
+    <dgm:fillClrLst meth="repeat">
+      <a:schemeClr val="lt1">
+        <a:alpha val="90000"/>
+      </a:schemeClr>
+    </dgm:fillClrLst>
+    <dgm:linClrLst meth="repeat">
+      <a:schemeClr val="accent5"/>
+    </dgm:linClrLst>
+    <dgm:effectClrLst/>
+    <dgm:txLinClrLst/>
+    <dgm:txFillClrLst meth="repeat">
+      <a:schemeClr val="dk1"/>
+    </dgm:txFillClrLst>
+    <dgm:txEffectClrLst/>
+  </dgm:styleLbl>
+  <dgm:styleLbl name="trAlignAcc1">
+    <dgm:fillClrLst meth="repeat">
+      <a:schemeClr val="lt1">
+        <a:alpha val="40000"/>
+      </a:schemeClr>
+    </dgm:fillClrLst>
+    <dgm:linClrLst meth="repeat">
+      <a:schemeClr val="accent5"/>
+    </dgm:linClrLst>
+    <dgm:effectClrLst/>
+    <dgm:txLinClrLst/>
+    <dgm:txFillClrLst meth="repeat">
+      <a:schemeClr val="dk1"/>
+    </dgm:txFillClrLst>
+    <dgm:txEffectClrLst/>
+  </dgm:styleLbl>
+  <dgm:styleLbl name="bgAcc1">
+    <dgm:fillClrLst meth="repeat">
+      <a:schemeClr val="lt1">
+        <a:alpha val="90000"/>
+      </a:schemeClr>
+    </dgm:fillClrLst>
+    <dgm:linClrLst meth="repeat">
+      <a:schemeClr val="accent5"/>
+    </dgm:linClrLst>
+    <dgm:effectClrLst/>
+    <dgm:txLinClrLst/>
+    <dgm:txFillClrLst meth="repeat">
+      <a:schemeClr val="dk1"/>
+    </dgm:txFillClrLst>
+    <dgm:txEffectClrLst/>
+  </dgm:styleLbl>
+  <dgm:styleLbl name="solidFgAcc1">
+    <dgm:fillClrLst meth="repeat">
+      <a:schemeClr val="lt1"/>
+    </dgm:fillClrLst>
+    <dgm:linClrLst meth="repeat">
+      <a:schemeClr val="accent5"/>
+    </dgm:linClrLst>
+    <dgm:effectClrLst/>
+    <dgm:txLinClrLst/>
+    <dgm:txFillClrLst meth="repeat">
+      <a:schemeClr val="dk1"/>
+    </dgm:txFillClrLst>
+    <dgm:txEffectClrLst/>
+  </dgm:styleLbl>
+  <dgm:styleLbl name="solidAlignAcc1">
+    <dgm:fillClrLst meth="repeat">
+      <a:schemeClr val="lt1"/>
+    </dgm:fillClrLst>
+    <dgm:linClrLst meth="repeat">
+      <a:schemeClr val="accent5"/>
+    </dgm:linClrLst>
+    <dgm:effectClrLst/>
+    <dgm:txLinClrLst/>
+    <dgm:txFillClrLst meth="repeat">
+      <a:schemeClr val="dk1"/>
+    </dgm:txFillClrLst>
+    <dgm:txEffectClrLst/>
+  </dgm:styleLbl>
+  <dgm:styleLbl name="solidBgAcc1">
+    <dgm:fillClrLst meth="repeat">
+      <a:schemeClr val="lt1"/>
+    </dgm:fillClrLst>
+    <dgm:linClrLst meth="repeat">
+      <a:schemeClr val="accent5"/>
+    </dgm:linClrLst>
+    <dgm:effectClrLst/>
+    <dgm:txLinClrLst/>
+    <dgm:txFillClrLst meth="repeat">
+      <a:schemeClr val="dk1"/>
+    </dgm:txFillClrLst>
+    <dgm:txEffectClrLst/>
+  </dgm:styleLbl>
+  <dgm:styleLbl name="fgAccFollowNode1">
+    <dgm:fillClrLst meth="repeat">
+      <a:schemeClr val="accent5">
+        <a:alpha val="90000"/>
+        <a:tint val="40000"/>
+      </a:schemeClr>
+    </dgm:fillClrLst>
+    <dgm:linClrLst meth="repeat">
+      <a:schemeClr val="accent5">
+        <a:alpha val="90000"/>
+        <a:tint val="40000"/>
+      </a:schemeClr>
+    </dgm:linClrLst>
+    <dgm:effectClrLst/>
+    <dgm:txLinClrLst/>
+    <dgm:txFillClrLst meth="repeat">
+      <a:schemeClr val="dk1"/>
+    </dgm:txFillClrLst>
+    <dgm:txEffectClrLst/>
+  </dgm:styleLbl>
+  <dgm:styleLbl name="alignAccFollowNode1">
+    <dgm:fillClrLst meth="repeat">
+      <a:schemeClr val="accent5">
+        <a:alpha val="90000"/>
+        <a:tint val="40000"/>
+      </a:schemeClr>
+    </dgm:fillClrLst>
+    <dgm:linClrLst meth="repeat">
+      <a:schemeClr val="accent5">
+        <a:alpha val="90000"/>
+        <a:tint val="40000"/>
+      </a:schemeClr>
+    </dgm:linClrLst>
+    <dgm:effectClrLst/>
+    <dgm:txLinClrLst/>
+    <dgm:txFillClrLst meth="repeat">
+      <a:schemeClr val="dk1"/>
+    </dgm:txFillClrLst>
+    <dgm:txEffectClrLst/>
+  </dgm:styleLbl>
+  <dgm:styleLbl name="bgAccFollowNode1">
+    <dgm:fillClrLst meth="repeat">
+      <a:schemeClr val="accent5">
+        <a:alpha val="90000"/>
+        <a:tint val="40000"/>
+      </a:schemeClr>
+    </dgm:fillClrLst>
+    <dgm:linClrLst meth="repeat">
+      <a:schemeClr val="accent5">
+        <a:alpha val="90000"/>
+        <a:tint val="40000"/>
+      </a:schemeClr>
+    </dgm:linClrLst>
+    <dgm:effectClrLst/>
+    <dgm:txLinClrLst/>
+    <dgm:txFillClrLst meth="repeat">
+      <a:schemeClr val="dk1"/>
+    </dgm:txFillClrLst>
+    <dgm:txEffectClrLst/>
+  </dgm:styleLbl>
+  <dgm:styleLbl name="fgAcc0">
+    <dgm:fillClrLst meth="repeat">
+      <a:schemeClr val="lt1">
+        <a:alpha val="90000"/>
+      </a:schemeClr>
+    </dgm:fillClrLst>
+    <dgm:linClrLst meth="repeat">
+      <a:schemeClr val="accent5"/>
+    </dgm:linClrLst>
+    <dgm:effectClrLst/>
+    <dgm:txLinClrLst/>
+    <dgm:txFillClrLst meth="repeat">
+      <a:schemeClr val="dk1"/>
+    </dgm:txFillClrLst>
+    <dgm:txEffectClrLst/>
+  </dgm:styleLbl>
+  <dgm:styleLbl name="fgAcc2">
+    <dgm:fillClrLst meth="repeat">
+      <a:schemeClr val="lt1">
+        <a:alpha val="90000"/>
+      </a:schemeClr>
+    </dgm:fillClrLst>
+    <dgm:linClrLst meth="repeat">
+      <a:schemeClr val="accent5"/>
+    </dgm:linClrLst>
+    <dgm:effectClrLst/>
+    <dgm:txLinClrLst/>
+    <dgm:txFillClrLst meth="repeat">
+      <a:schemeClr val="dk1"/>
+    </dgm:txFillClrLst>
+    <dgm:txEffectClrLst/>
+  </dgm:styleLbl>
+  <dgm:styleLbl name="fgAcc3">
+    <dgm:fillClrLst meth="repeat">
+      <a:schemeClr val="lt1">
+        <a:alpha val="90000"/>
+      </a:schemeClr>
+    </dgm:fillClrLst>
+    <dgm:linClrLst meth="repeat">
+      <a:schemeClr val="accent5"/>
+    </dgm:linClrLst>
+    <dgm:effectClrLst/>
+    <dgm:txLinClrLst/>
+    <dgm:txFillClrLst meth="repeat">
+      <a:schemeClr val="dk1"/>
+    </dgm:txFillClrLst>
+    <dgm:txEffectClrLst/>
+  </dgm:styleLbl>
+  <dgm:styleLbl name="fgAcc4">
+    <dgm:fillClrLst meth="repeat">
+      <a:schemeClr val="lt1">
+        <a:alpha val="90000"/>
+      </a:schemeClr>
+    </dgm:fillClrLst>
+    <dgm:linClrLst meth="repeat">
+      <a:schemeClr val="accent5"/>
+    </dgm:linClrLst>
+    <dgm:effectClrLst/>
+    <dgm:txLinClrLst/>
+    <dgm:txFillClrLst meth="repeat">
+      <a:schemeClr val="dk1"/>
+    </dgm:txFillClrLst>
+    <dgm:txEffectClrLst/>
+  </dgm:styleLbl>
+  <dgm:styleLbl name="bgShp">
+    <dgm:fillClrLst meth="repeat">
+      <a:schemeClr val="accent5">
+        <a:tint val="40000"/>
+      </a:schemeClr>
+    </dgm:fillClrLst>
+    <dgm:linClrLst meth="repeat">
+      <a:schemeClr val="accent5"/>
+    </dgm:linClrLst>
+    <dgm:effectClrLst/>
+    <dgm:txLinClrLst/>
+    <dgm:txFillClrLst meth="repeat">
+      <a:schemeClr val="dk1"/>
+    </dgm:txFillClrLst>
+    <dgm:txEffectClrLst/>
+  </dgm:styleLbl>
+  <dgm:styleLbl name="dkBgShp">
+    <dgm:fillClrLst meth="repeat">
+      <a:schemeClr val="accent5">
+        <a:shade val="80000"/>
+      </a:schemeClr>
+    </dgm:fillClrLst>
+    <dgm:linClrLst meth="repeat">
+      <a:schemeClr val="accent5"/>
+    </dgm:linClrLst>
+    <dgm:effectClrLst/>
+    <dgm:txLinClrLst/>
+    <dgm:txFillClrLst meth="repeat">
+      <a:schemeClr val="lt1"/>
+    </dgm:txFillClrLst>
+    <dgm:txEffectClrLst/>
+  </dgm:styleLbl>
+  <dgm:styleLbl name="trBgShp">
+    <dgm:fillClrLst meth="repeat">
+      <a:schemeClr val="accent5">
+        <a:tint val="50000"/>
+        <a:alpha val="40000"/>
+      </a:schemeClr>
+    </dgm:fillClrLst>
+    <dgm:linClrLst meth="repeat">
+      <a:schemeClr val="accent5"/>
+    </dgm:linClrLst>
+    <dgm:effectClrLst/>
+    <dgm:txLinClrLst/>
+    <dgm:txFillClrLst meth="repeat">
+      <a:schemeClr val="lt1"/>
+    </dgm:txFillClrLst>
+    <dgm:txEffectClrLst/>
+  </dgm:styleLbl>
+  <dgm:styleLbl name="fgShp">
+    <dgm:fillClrLst meth="repeat">
+      <a:schemeClr val="accent5">
+        <a:tint val="60000"/>
       </a:schemeClr>
     </dgm:fillClrLst>
     <dgm:linClrLst meth="repeat">
@@ -1475,6 +2228,298 @@
 </dgm:dataModel>
 </file>
 
+<file path=ppt/diagrams/data2.xml><?xml version="1.0" encoding="utf-8"?>
+<dgm:dataModel xmlns:dgm="http://schemas.openxmlformats.org/drawingml/2006/diagram" xmlns:a="http://schemas.openxmlformats.org/drawingml/2006/main">
+  <dgm:ptLst>
+    <dgm:pt modelId="{592373DC-11B1-4708-92E2-E1B8EB8D76D8}" type="doc">
+      <dgm:prSet loTypeId="urn:microsoft.com/office/officeart/2018/2/layout/IconVerticalSolidList" loCatId="icon" qsTypeId="urn:microsoft.com/office/officeart/2005/8/quickstyle/simple1" qsCatId="simple" csTypeId="urn:microsoft.com/office/officeart/2005/8/colors/accent5_2" csCatId="accent5" phldr="1"/>
+      <dgm:spPr/>
+    </dgm:pt>
+    <dgm:pt modelId="{7084B800-7E1D-4DA6-89C0-37EA52DDBCB8}">
+      <dgm:prSet phldrT="[Text]" custT="1"/>
+      <dgm:spPr/>
+      <dgm:t>
+        <a:bodyPr/>
+        <a:lstStyle/>
+        <a:p>
+          <a:pPr>
+            <a:lnSpc>
+              <a:spcPct val="100000"/>
+            </a:lnSpc>
+          </a:pPr>
+          <a:r>
+            <a:rPr lang="en-US" sz="2100" dirty="0">
+              <a:solidFill>
+                <a:schemeClr val="bg2">
+                  <a:lumMod val="50000"/>
+                </a:schemeClr>
+              </a:solidFill>
+            </a:rPr>
+            <a:t>Standalone DFS namespace</a:t>
+          </a:r>
+          <a:endParaRPr lang="ru-RU" sz="2100" dirty="0">
+            <a:solidFill>
+              <a:schemeClr val="bg2">
+                <a:lumMod val="50000"/>
+              </a:schemeClr>
+            </a:solidFill>
+          </a:endParaRPr>
+        </a:p>
+      </dgm:t>
+    </dgm:pt>
+    <dgm:pt modelId="{E459F664-A62C-4466-90D1-14D94F7456F9}" type="parTrans" cxnId="{D7BBB8C6-B60F-4050-B5C1-3F3A86AF4294}">
+      <dgm:prSet/>
+      <dgm:spPr/>
+      <dgm:t>
+        <a:bodyPr/>
+        <a:lstStyle/>
+        <a:p>
+          <a:endParaRPr lang="ru-RU"/>
+        </a:p>
+      </dgm:t>
+    </dgm:pt>
+    <dgm:pt modelId="{29667D30-8073-4626-A65C-0442C9DA4455}" type="sibTrans" cxnId="{D7BBB8C6-B60F-4050-B5C1-3F3A86AF4294}">
+      <dgm:prSet/>
+      <dgm:spPr/>
+      <dgm:t>
+        <a:bodyPr/>
+        <a:lstStyle/>
+        <a:p>
+          <a:endParaRPr lang="ru-RU"/>
+        </a:p>
+      </dgm:t>
+    </dgm:pt>
+    <dgm:pt modelId="{4786322A-3DB1-4B13-A039-9C2B4BD33902}">
+      <dgm:prSet phldrT="[Text]" custT="1"/>
+      <dgm:spPr/>
+      <dgm:t>
+        <a:bodyPr/>
+        <a:lstStyle/>
+        <a:p>
+          <a:pPr>
+            <a:lnSpc>
+              <a:spcPct val="100000"/>
+            </a:lnSpc>
+          </a:pPr>
+          <a:r>
+            <a:rPr lang="en-US" sz="2100" kern="1200" dirty="0">
+              <a:solidFill>
+                <a:srgbClr val="E2E2E8">
+                  <a:lumMod val="50000"/>
+                </a:srgbClr>
+              </a:solidFill>
+              <a:latin typeface="Garamond" panose="02020404030301010803"/>
+              <a:ea typeface="+mn-ea"/>
+              <a:cs typeface="+mn-cs"/>
+            </a:rPr>
+            <a:t>Domain-based DFS namespace</a:t>
+          </a:r>
+          <a:endParaRPr lang="ru-RU" sz="2100" kern="1200" dirty="0">
+            <a:solidFill>
+              <a:srgbClr val="E2E2E8">
+                <a:lumMod val="50000"/>
+              </a:srgbClr>
+            </a:solidFill>
+            <a:latin typeface="Garamond" panose="02020404030301010803"/>
+            <a:ea typeface="+mn-ea"/>
+            <a:cs typeface="+mn-cs"/>
+          </a:endParaRPr>
+        </a:p>
+      </dgm:t>
+    </dgm:pt>
+    <dgm:pt modelId="{4F3F2426-EA56-4F79-A02F-DE7A210D680D}" type="parTrans" cxnId="{07D1F65C-7C41-4EB6-A133-CA7F29791640}">
+      <dgm:prSet/>
+      <dgm:spPr/>
+      <dgm:t>
+        <a:bodyPr/>
+        <a:lstStyle/>
+        <a:p>
+          <a:endParaRPr lang="ru-RU"/>
+        </a:p>
+      </dgm:t>
+    </dgm:pt>
+    <dgm:pt modelId="{7D0A801E-90E9-4D73-A31E-D58F04D3BBF2}" type="sibTrans" cxnId="{07D1F65C-7C41-4EB6-A133-CA7F29791640}">
+      <dgm:prSet/>
+      <dgm:spPr/>
+      <dgm:t>
+        <a:bodyPr/>
+        <a:lstStyle/>
+        <a:p>
+          <a:endParaRPr lang="ru-RU"/>
+        </a:p>
+      </dgm:t>
+    </dgm:pt>
+    <dgm:pt modelId="{BEBE168A-5E85-43CC-B9BA-D1974F9A5753}" type="pres">
+      <dgm:prSet presAssocID="{592373DC-11B1-4708-92E2-E1B8EB8D76D8}" presName="root" presStyleCnt="0">
+        <dgm:presLayoutVars>
+          <dgm:dir/>
+          <dgm:resizeHandles val="exact"/>
+        </dgm:presLayoutVars>
+      </dgm:prSet>
+      <dgm:spPr/>
+    </dgm:pt>
+    <dgm:pt modelId="{6F7D1589-E38C-4EEF-8940-633D1FA307AE}" type="pres">
+      <dgm:prSet presAssocID="{7084B800-7E1D-4DA6-89C0-37EA52DDBCB8}" presName="compNode" presStyleCnt="0"/>
+      <dgm:spPr/>
+    </dgm:pt>
+    <dgm:pt modelId="{5055791F-FD8B-4C95-BE9E-DCA1684759AE}" type="pres">
+      <dgm:prSet presAssocID="{7084B800-7E1D-4DA6-89C0-37EA52DDBCB8}" presName="bgRect" presStyleLbl="bgShp" presStyleIdx="0" presStyleCnt="2"/>
+      <dgm:spPr>
+        <a:prstGeom prst="rect">
+          <a:avLst/>
+        </a:prstGeom>
+        <a:solidFill>
+          <a:schemeClr val="bg1"/>
+        </a:solidFill>
+        <a:ln>
+          <a:solidFill>
+            <a:schemeClr val="bg2">
+              <a:lumMod val="75000"/>
+            </a:schemeClr>
+          </a:solidFill>
+        </a:ln>
+      </dgm:spPr>
+    </dgm:pt>
+    <dgm:pt modelId="{3A2A1665-F91D-4C16-A420-BA5DD166AEE3}" type="pres">
+      <dgm:prSet presAssocID="{7084B800-7E1D-4DA6-89C0-37EA52DDBCB8}" presName="iconRect" presStyleLbl="node1" presStyleIdx="0" presStyleCnt="2"/>
+      <dgm:spPr>
+        <a:blipFill>
+          <a:blip xmlns:r="http://schemas.openxmlformats.org/officeDocument/2006/relationships" r:embed="rId1">
+            <a:extLst>
+              <a:ext uri="{28A0092B-C50C-407E-A947-70E740481C1C}">
+                <a14:useLocalDpi xmlns:a14="http://schemas.microsoft.com/office/drawing/2010/main" val="0"/>
+              </a:ext>
+              <a:ext uri="{96DAC541-7B7A-43D3-8B79-37D633B846F1}">
+                <asvg:svgBlip xmlns:asvg="http://schemas.microsoft.com/office/drawing/2016/SVG/main" r:embed="rId2"/>
+              </a:ext>
+            </a:extLst>
+          </a:blip>
+          <a:stretch>
+            <a:fillRect/>
+          </a:stretch>
+        </a:blipFill>
+        <a:ln>
+          <a:noFill/>
+        </a:ln>
+      </dgm:spPr>
+      <dgm:extLst>
+        <a:ext uri="{E40237B7-FDA0-4F09-8148-C483321AD2D9}">
+          <dgm14:cNvPr xmlns:dgm14="http://schemas.microsoft.com/office/drawing/2010/diagram" id="0" name="" descr="Internet"/>
+        </a:ext>
+      </dgm:extLst>
+    </dgm:pt>
+    <dgm:pt modelId="{2BD51AD2-3E0A-4639-9A99-2EB58CCE5B59}" type="pres">
+      <dgm:prSet presAssocID="{7084B800-7E1D-4DA6-89C0-37EA52DDBCB8}" presName="spaceRect" presStyleCnt="0"/>
+      <dgm:spPr/>
+    </dgm:pt>
+    <dgm:pt modelId="{C777032A-9475-4396-9274-DE9A78A74CC0}" type="pres">
+      <dgm:prSet presAssocID="{7084B800-7E1D-4DA6-89C0-37EA52DDBCB8}" presName="parTx" presStyleLbl="revTx" presStyleIdx="0" presStyleCnt="2" custLinFactNeighborX="-5805">
+        <dgm:presLayoutVars>
+          <dgm:chMax val="0"/>
+          <dgm:chPref val="0"/>
+        </dgm:presLayoutVars>
+      </dgm:prSet>
+      <dgm:spPr/>
+    </dgm:pt>
+    <dgm:pt modelId="{E8F86784-F939-4DC2-B805-3A2239B0770F}" type="pres">
+      <dgm:prSet presAssocID="{29667D30-8073-4626-A65C-0442C9DA4455}" presName="sibTrans" presStyleCnt="0"/>
+      <dgm:spPr/>
+    </dgm:pt>
+    <dgm:pt modelId="{B1715078-3176-4DF1-A2E4-CA69BD0DE3DE}" type="pres">
+      <dgm:prSet presAssocID="{4786322A-3DB1-4B13-A039-9C2B4BD33902}" presName="compNode" presStyleCnt="0"/>
+      <dgm:spPr/>
+    </dgm:pt>
+    <dgm:pt modelId="{7CF4F8AE-2437-4954-B698-495A078F9E64}" type="pres">
+      <dgm:prSet presAssocID="{4786322A-3DB1-4B13-A039-9C2B4BD33902}" presName="bgRect" presStyleLbl="bgShp" presStyleIdx="1" presStyleCnt="2"/>
+      <dgm:spPr>
+        <a:prstGeom prst="rect">
+          <a:avLst/>
+        </a:prstGeom>
+        <a:solidFill>
+          <a:schemeClr val="bg1"/>
+        </a:solidFill>
+        <a:ln>
+          <a:solidFill>
+            <a:schemeClr val="bg2">
+              <a:lumMod val="75000"/>
+            </a:schemeClr>
+          </a:solidFill>
+        </a:ln>
+      </dgm:spPr>
+    </dgm:pt>
+    <dgm:pt modelId="{321B0D94-DDA9-4A26-A4C1-0608CDA16D85}" type="pres">
+      <dgm:prSet presAssocID="{4786322A-3DB1-4B13-A039-9C2B4BD33902}" presName="iconRect" presStyleLbl="node1" presStyleIdx="1" presStyleCnt="2"/>
+      <dgm:spPr>
+        <a:blipFill>
+          <a:blip xmlns:r="http://schemas.openxmlformats.org/officeDocument/2006/relationships" r:embed="rId3">
+            <a:extLst>
+              <a:ext uri="{28A0092B-C50C-407E-A947-70E740481C1C}">
+                <a14:useLocalDpi xmlns:a14="http://schemas.microsoft.com/office/drawing/2010/main" val="0"/>
+              </a:ext>
+              <a:ext uri="{96DAC541-7B7A-43D3-8B79-37D633B846F1}">
+                <asvg:svgBlip xmlns:asvg="http://schemas.microsoft.com/office/drawing/2016/SVG/main" r:embed="rId4"/>
+              </a:ext>
+            </a:extLst>
+          </a:blip>
+          <a:srcRect/>
+          <a:stretch>
+            <a:fillRect/>
+          </a:stretch>
+        </a:blipFill>
+        <a:ln>
+          <a:noFill/>
+        </a:ln>
+      </dgm:spPr>
+      <dgm:extLst>
+        <a:ext uri="{E40237B7-FDA0-4F09-8148-C483321AD2D9}">
+          <dgm14:cNvPr xmlns:dgm14="http://schemas.microsoft.com/office/drawing/2010/diagram" id="0" name="" descr="Stream"/>
+        </a:ext>
+      </dgm:extLst>
+    </dgm:pt>
+    <dgm:pt modelId="{6B38183A-C137-4797-A6AA-5032FB424C80}" type="pres">
+      <dgm:prSet presAssocID="{4786322A-3DB1-4B13-A039-9C2B4BD33902}" presName="spaceRect" presStyleCnt="0"/>
+      <dgm:spPr/>
+    </dgm:pt>
+    <dgm:pt modelId="{8988E990-E700-4C93-BC55-7BF7864AEFFE}" type="pres">
+      <dgm:prSet presAssocID="{4786322A-3DB1-4B13-A039-9C2B4BD33902}" presName="parTx" presStyleLbl="revTx" presStyleIdx="1" presStyleCnt="2" custScaleX="111492" custLinFactNeighborX="-5805">
+        <dgm:presLayoutVars>
+          <dgm:chMax val="0"/>
+          <dgm:chPref val="0"/>
+        </dgm:presLayoutVars>
+      </dgm:prSet>
+      <dgm:spPr/>
+    </dgm:pt>
+  </dgm:ptLst>
+  <dgm:cxnLst>
+    <dgm:cxn modelId="{63841A12-C18B-1141-BB66-67F94352C339}" type="presOf" srcId="{7084B800-7E1D-4DA6-89C0-37EA52DDBCB8}" destId="{C777032A-9475-4396-9274-DE9A78A74CC0}" srcOrd="0" destOrd="0" presId="urn:microsoft.com/office/officeart/2018/2/layout/IconVerticalSolidList"/>
+    <dgm:cxn modelId="{07D1F65C-7C41-4EB6-A133-CA7F29791640}" srcId="{592373DC-11B1-4708-92E2-E1B8EB8D76D8}" destId="{4786322A-3DB1-4B13-A039-9C2B4BD33902}" srcOrd="1" destOrd="0" parTransId="{4F3F2426-EA56-4F79-A02F-DE7A210D680D}" sibTransId="{7D0A801E-90E9-4D73-A31E-D58F04D3BBF2}"/>
+    <dgm:cxn modelId="{9B527D63-3134-1743-961D-BB943F9BC328}" type="presOf" srcId="{4786322A-3DB1-4B13-A039-9C2B4BD33902}" destId="{8988E990-E700-4C93-BC55-7BF7864AEFFE}" srcOrd="0" destOrd="0" presId="urn:microsoft.com/office/officeart/2018/2/layout/IconVerticalSolidList"/>
+    <dgm:cxn modelId="{99FCC3A2-7D1A-B343-BC04-AA140FF8D6F7}" type="presOf" srcId="{592373DC-11B1-4708-92E2-E1B8EB8D76D8}" destId="{BEBE168A-5E85-43CC-B9BA-D1974F9A5753}" srcOrd="0" destOrd="0" presId="urn:microsoft.com/office/officeart/2018/2/layout/IconVerticalSolidList"/>
+    <dgm:cxn modelId="{D7BBB8C6-B60F-4050-B5C1-3F3A86AF4294}" srcId="{592373DC-11B1-4708-92E2-E1B8EB8D76D8}" destId="{7084B800-7E1D-4DA6-89C0-37EA52DDBCB8}" srcOrd="0" destOrd="0" parTransId="{E459F664-A62C-4466-90D1-14D94F7456F9}" sibTransId="{29667D30-8073-4626-A65C-0442C9DA4455}"/>
+    <dgm:cxn modelId="{EC6A6010-62D0-E741-9ED3-0E0A4F187C22}" type="presParOf" srcId="{BEBE168A-5E85-43CC-B9BA-D1974F9A5753}" destId="{6F7D1589-E38C-4EEF-8940-633D1FA307AE}" srcOrd="0" destOrd="0" presId="urn:microsoft.com/office/officeart/2018/2/layout/IconVerticalSolidList"/>
+    <dgm:cxn modelId="{3651A24D-686D-D14B-8701-AFB991DD91A7}" type="presParOf" srcId="{6F7D1589-E38C-4EEF-8940-633D1FA307AE}" destId="{5055791F-FD8B-4C95-BE9E-DCA1684759AE}" srcOrd="0" destOrd="0" presId="urn:microsoft.com/office/officeart/2018/2/layout/IconVerticalSolidList"/>
+    <dgm:cxn modelId="{7B546F74-9BC9-8B4A-907D-549F35C2FD3E}" type="presParOf" srcId="{6F7D1589-E38C-4EEF-8940-633D1FA307AE}" destId="{3A2A1665-F91D-4C16-A420-BA5DD166AEE3}" srcOrd="1" destOrd="0" presId="urn:microsoft.com/office/officeart/2018/2/layout/IconVerticalSolidList"/>
+    <dgm:cxn modelId="{E8DFB209-C627-2849-A9A8-82FA4FE3CBC9}" type="presParOf" srcId="{6F7D1589-E38C-4EEF-8940-633D1FA307AE}" destId="{2BD51AD2-3E0A-4639-9A99-2EB58CCE5B59}" srcOrd="2" destOrd="0" presId="urn:microsoft.com/office/officeart/2018/2/layout/IconVerticalSolidList"/>
+    <dgm:cxn modelId="{366B5496-FD7E-304F-8B99-D11946F94228}" type="presParOf" srcId="{6F7D1589-E38C-4EEF-8940-633D1FA307AE}" destId="{C777032A-9475-4396-9274-DE9A78A74CC0}" srcOrd="3" destOrd="0" presId="urn:microsoft.com/office/officeart/2018/2/layout/IconVerticalSolidList"/>
+    <dgm:cxn modelId="{DE81DE76-EB46-0649-BD1A-C07B117C077E}" type="presParOf" srcId="{BEBE168A-5E85-43CC-B9BA-D1974F9A5753}" destId="{E8F86784-F939-4DC2-B805-3A2239B0770F}" srcOrd="1" destOrd="0" presId="urn:microsoft.com/office/officeart/2018/2/layout/IconVerticalSolidList"/>
+    <dgm:cxn modelId="{81974EFD-7ED7-404C-A7EA-97800BA1897B}" type="presParOf" srcId="{BEBE168A-5E85-43CC-B9BA-D1974F9A5753}" destId="{B1715078-3176-4DF1-A2E4-CA69BD0DE3DE}" srcOrd="2" destOrd="0" presId="urn:microsoft.com/office/officeart/2018/2/layout/IconVerticalSolidList"/>
+    <dgm:cxn modelId="{7B2034C8-584E-E84E-8A99-1E4DA478C58D}" type="presParOf" srcId="{B1715078-3176-4DF1-A2E4-CA69BD0DE3DE}" destId="{7CF4F8AE-2437-4954-B698-495A078F9E64}" srcOrd="0" destOrd="0" presId="urn:microsoft.com/office/officeart/2018/2/layout/IconVerticalSolidList"/>
+    <dgm:cxn modelId="{EBEFAFAD-B5F2-8F47-8319-9C351553D79B}" type="presParOf" srcId="{B1715078-3176-4DF1-A2E4-CA69BD0DE3DE}" destId="{321B0D94-DDA9-4A26-A4C1-0608CDA16D85}" srcOrd="1" destOrd="0" presId="urn:microsoft.com/office/officeart/2018/2/layout/IconVerticalSolidList"/>
+    <dgm:cxn modelId="{0C0BCCB3-B2AC-DB41-9209-8BD32F39E7CA}" type="presParOf" srcId="{B1715078-3176-4DF1-A2E4-CA69BD0DE3DE}" destId="{6B38183A-C137-4797-A6AA-5032FB424C80}" srcOrd="2" destOrd="0" presId="urn:microsoft.com/office/officeart/2018/2/layout/IconVerticalSolidList"/>
+    <dgm:cxn modelId="{6AF7860D-FDAE-D944-A15C-8365DBB36ED6}" type="presParOf" srcId="{B1715078-3176-4DF1-A2E4-CA69BD0DE3DE}" destId="{8988E990-E700-4C93-BC55-7BF7864AEFFE}" srcOrd="3" destOrd="0" presId="urn:microsoft.com/office/officeart/2018/2/layout/IconVerticalSolidList"/>
+  </dgm:cxnLst>
+  <dgm:bg>
+    <a:noFill/>
+  </dgm:bg>
+  <dgm:whole/>
+  <dgm:extLst>
+    <a:ext uri="http://schemas.microsoft.com/office/drawing/2008/diagram">
+      <dsp:dataModelExt xmlns:dsp="http://schemas.microsoft.com/office/drawing/2008/diagram" relId="rId8" minVer="http://schemas.openxmlformats.org/drawingml/2006/diagram"/>
+    </a:ext>
+  </dgm:extLst>
+</dgm:dataModel>
+</file>
+
 <file path=ppt/diagrams/drawing1.xml><?xml version="1.0" encoding="utf-8"?>
 <dsp:drawing xmlns:dgm="http://schemas.openxmlformats.org/drawingml/2006/diagram" xmlns:dsp="http://schemas.microsoft.com/office/drawing/2008/diagram" xmlns:a="http://schemas.openxmlformats.org/drawingml/2006/main">
   <dsp:spTree>
@@ -1884,6 +2929,347 @@
 </dsp:drawing>
 </file>
 
+<file path=ppt/diagrams/drawing2.xml><?xml version="1.0" encoding="utf-8"?>
+<dsp:drawing xmlns:dgm="http://schemas.openxmlformats.org/drawingml/2006/diagram" xmlns:dsp="http://schemas.microsoft.com/office/drawing/2008/diagram" xmlns:a="http://schemas.openxmlformats.org/drawingml/2006/main">
+  <dsp:spTree>
+    <dsp:nvGrpSpPr>
+      <dsp:cNvPr id="0" name=""/>
+      <dsp:cNvGrpSpPr/>
+    </dsp:nvGrpSpPr>
+    <dsp:grpSpPr/>
+    <dsp:sp modelId="{5055791F-FD8B-4C95-BE9E-DCA1684759AE}">
+      <dsp:nvSpPr>
+        <dsp:cNvPr id="0" name=""/>
+        <dsp:cNvSpPr/>
+      </dsp:nvSpPr>
+      <dsp:spPr>
+        <a:xfrm>
+          <a:off x="-95494" y="613998"/>
+          <a:ext cx="4664075" cy="1120040"/>
+        </a:xfrm>
+        <a:prstGeom prst="rect">
+          <a:avLst/>
+        </a:prstGeom>
+        <a:solidFill>
+          <a:schemeClr val="bg1"/>
+        </a:solidFill>
+        <a:ln>
+          <a:solidFill>
+            <a:schemeClr val="bg2">
+              <a:lumMod val="75000"/>
+            </a:schemeClr>
+          </a:solidFill>
+        </a:ln>
+        <a:effectLst/>
+      </dsp:spPr>
+      <dsp:style>
+        <a:lnRef idx="0">
+          <a:scrgbClr r="0" g="0" b="0"/>
+        </a:lnRef>
+        <a:fillRef idx="1">
+          <a:scrgbClr r="0" g="0" b="0"/>
+        </a:fillRef>
+        <a:effectRef idx="0">
+          <a:scrgbClr r="0" g="0" b="0"/>
+        </a:effectRef>
+        <a:fontRef idx="minor"/>
+      </dsp:style>
+    </dsp:sp>
+    <dsp:sp modelId="{3A2A1665-F91D-4C16-A420-BA5DD166AEE3}">
+      <dsp:nvSpPr>
+        <dsp:cNvPr id="0" name=""/>
+        <dsp:cNvSpPr/>
+      </dsp:nvSpPr>
+      <dsp:spPr>
+        <a:xfrm>
+          <a:off x="243317" y="866007"/>
+          <a:ext cx="616022" cy="616022"/>
+        </a:xfrm>
+        <a:prstGeom prst="rect">
+          <a:avLst/>
+        </a:prstGeom>
+        <a:blipFill>
+          <a:blip xmlns:r="http://schemas.openxmlformats.org/officeDocument/2006/relationships" r:embed="rId1">
+            <a:extLst>
+              <a:ext uri="{28A0092B-C50C-407E-A947-70E740481C1C}">
+                <a14:useLocalDpi xmlns:a14="http://schemas.microsoft.com/office/drawing/2010/main" val="0"/>
+              </a:ext>
+              <a:ext uri="{96DAC541-7B7A-43D3-8B79-37D633B846F1}">
+                <asvg:svgBlip xmlns:asvg="http://schemas.microsoft.com/office/drawing/2016/SVG/main" r:embed="rId2"/>
+              </a:ext>
+            </a:extLst>
+          </a:blip>
+          <a:stretch>
+            <a:fillRect/>
+          </a:stretch>
+        </a:blipFill>
+        <a:ln w="25400" cap="flat" cmpd="sng" algn="ctr">
+          <a:noFill/>
+          <a:prstDash val="solid"/>
+          <a:miter/>
+        </a:ln>
+        <a:effectLst/>
+      </dsp:spPr>
+      <dsp:style>
+        <a:lnRef idx="2">
+          <a:scrgbClr r="0" g="0" b="0"/>
+        </a:lnRef>
+        <a:fillRef idx="1">
+          <a:scrgbClr r="0" g="0" b="0"/>
+        </a:fillRef>
+        <a:effectRef idx="0">
+          <a:scrgbClr r="0" g="0" b="0"/>
+        </a:effectRef>
+        <a:fontRef idx="minor">
+          <a:schemeClr val="lt1"/>
+        </a:fontRef>
+      </dsp:style>
+    </dsp:sp>
+    <dsp:sp modelId="{C777032A-9475-4396-9274-DE9A78A74CC0}">
+      <dsp:nvSpPr>
+        <dsp:cNvPr id="0" name=""/>
+        <dsp:cNvSpPr/>
+      </dsp:nvSpPr>
+      <dsp:spPr>
+        <a:xfrm>
+          <a:off x="1002645" y="613998"/>
+          <a:ext cx="3367898" cy="1120040"/>
+        </a:xfrm>
+        <a:prstGeom prst="rect">
+          <a:avLst/>
+        </a:prstGeom>
+        <a:noFill/>
+        <a:ln>
+          <a:noFill/>
+        </a:ln>
+        <a:effectLst/>
+      </dsp:spPr>
+      <dsp:style>
+        <a:lnRef idx="0">
+          <a:scrgbClr r="0" g="0" b="0"/>
+        </a:lnRef>
+        <a:fillRef idx="0">
+          <a:scrgbClr r="0" g="0" b="0"/>
+        </a:fillRef>
+        <a:effectRef idx="0">
+          <a:scrgbClr r="0" g="0" b="0"/>
+        </a:effectRef>
+        <a:fontRef idx="minor"/>
+      </dsp:style>
+      <dsp:txBody>
+        <a:bodyPr spcFirstLastPara="0" vert="horz" wrap="square" lIns="118538" tIns="118538" rIns="118538" bIns="118538" numCol="1" spcCol="1270" anchor="ctr" anchorCtr="0">
+          <a:noAutofit/>
+        </a:bodyPr>
+        <a:lstStyle/>
+        <a:p>
+          <a:pPr marL="0" lvl="0" indent="0" algn="l" defTabSz="933450">
+            <a:lnSpc>
+              <a:spcPct val="100000"/>
+            </a:lnSpc>
+            <a:spcBef>
+              <a:spcPct val="0"/>
+            </a:spcBef>
+            <a:spcAft>
+              <a:spcPct val="35000"/>
+            </a:spcAft>
+            <a:buNone/>
+          </a:pPr>
+          <a:r>
+            <a:rPr lang="en-US" sz="2100" kern="1200" dirty="0">
+              <a:solidFill>
+                <a:schemeClr val="bg2">
+                  <a:lumMod val="50000"/>
+                </a:schemeClr>
+              </a:solidFill>
+            </a:rPr>
+            <a:t>Standalone DFS namespace</a:t>
+          </a:r>
+          <a:endParaRPr lang="ru-RU" sz="2100" kern="1200" dirty="0">
+            <a:solidFill>
+              <a:schemeClr val="bg2">
+                <a:lumMod val="50000"/>
+              </a:schemeClr>
+            </a:solidFill>
+          </a:endParaRPr>
+        </a:p>
+      </dsp:txBody>
+      <dsp:txXfrm>
+        <a:off x="1002645" y="613998"/>
+        <a:ext cx="3367898" cy="1120040"/>
+      </dsp:txXfrm>
+    </dsp:sp>
+    <dsp:sp modelId="{7CF4F8AE-2437-4954-B698-495A078F9E64}">
+      <dsp:nvSpPr>
+        <dsp:cNvPr id="0" name=""/>
+        <dsp:cNvSpPr/>
+      </dsp:nvSpPr>
+      <dsp:spPr>
+        <a:xfrm>
+          <a:off x="-95494" y="2014048"/>
+          <a:ext cx="4664075" cy="1120040"/>
+        </a:xfrm>
+        <a:prstGeom prst="rect">
+          <a:avLst/>
+        </a:prstGeom>
+        <a:solidFill>
+          <a:schemeClr val="bg1"/>
+        </a:solidFill>
+        <a:ln>
+          <a:solidFill>
+            <a:schemeClr val="bg2">
+              <a:lumMod val="75000"/>
+            </a:schemeClr>
+          </a:solidFill>
+        </a:ln>
+        <a:effectLst/>
+      </dsp:spPr>
+      <dsp:style>
+        <a:lnRef idx="0">
+          <a:scrgbClr r="0" g="0" b="0"/>
+        </a:lnRef>
+        <a:fillRef idx="1">
+          <a:scrgbClr r="0" g="0" b="0"/>
+        </a:fillRef>
+        <a:effectRef idx="0">
+          <a:scrgbClr r="0" g="0" b="0"/>
+        </a:effectRef>
+        <a:fontRef idx="minor"/>
+      </dsp:style>
+    </dsp:sp>
+    <dsp:sp modelId="{321B0D94-DDA9-4A26-A4C1-0608CDA16D85}">
+      <dsp:nvSpPr>
+        <dsp:cNvPr id="0" name=""/>
+        <dsp:cNvSpPr/>
+      </dsp:nvSpPr>
+      <dsp:spPr>
+        <a:xfrm>
+          <a:off x="243317" y="2266057"/>
+          <a:ext cx="616022" cy="616022"/>
+        </a:xfrm>
+        <a:prstGeom prst="rect">
+          <a:avLst/>
+        </a:prstGeom>
+        <a:blipFill>
+          <a:blip xmlns:r="http://schemas.openxmlformats.org/officeDocument/2006/relationships" r:embed="rId3">
+            <a:extLst>
+              <a:ext uri="{28A0092B-C50C-407E-A947-70E740481C1C}">
+                <a14:useLocalDpi xmlns:a14="http://schemas.microsoft.com/office/drawing/2010/main" val="0"/>
+              </a:ext>
+              <a:ext uri="{96DAC541-7B7A-43D3-8B79-37D633B846F1}">
+                <asvg:svgBlip xmlns:asvg="http://schemas.microsoft.com/office/drawing/2016/SVG/main" r:embed="rId4"/>
+              </a:ext>
+            </a:extLst>
+          </a:blip>
+          <a:srcRect/>
+          <a:stretch>
+            <a:fillRect/>
+          </a:stretch>
+        </a:blipFill>
+        <a:ln w="25400" cap="flat" cmpd="sng" algn="ctr">
+          <a:noFill/>
+          <a:prstDash val="solid"/>
+          <a:miter/>
+        </a:ln>
+        <a:effectLst/>
+      </dsp:spPr>
+      <dsp:style>
+        <a:lnRef idx="2">
+          <a:scrgbClr r="0" g="0" b="0"/>
+        </a:lnRef>
+        <a:fillRef idx="1">
+          <a:scrgbClr r="0" g="0" b="0"/>
+        </a:fillRef>
+        <a:effectRef idx="0">
+          <a:scrgbClr r="0" g="0" b="0"/>
+        </a:effectRef>
+        <a:fontRef idx="minor">
+          <a:schemeClr val="lt1"/>
+        </a:fontRef>
+      </dsp:style>
+    </dsp:sp>
+    <dsp:sp modelId="{8988E990-E700-4C93-BC55-7BF7864AEFFE}">
+      <dsp:nvSpPr>
+        <dsp:cNvPr id="0" name=""/>
+        <dsp:cNvSpPr/>
+      </dsp:nvSpPr>
+      <dsp:spPr>
+        <a:xfrm>
+          <a:off x="809126" y="2014048"/>
+          <a:ext cx="3754937" cy="1120040"/>
+        </a:xfrm>
+        <a:prstGeom prst="rect">
+          <a:avLst/>
+        </a:prstGeom>
+        <a:noFill/>
+        <a:ln>
+          <a:noFill/>
+        </a:ln>
+        <a:effectLst/>
+      </dsp:spPr>
+      <dsp:style>
+        <a:lnRef idx="0">
+          <a:scrgbClr r="0" g="0" b="0"/>
+        </a:lnRef>
+        <a:fillRef idx="0">
+          <a:scrgbClr r="0" g="0" b="0"/>
+        </a:fillRef>
+        <a:effectRef idx="0">
+          <a:scrgbClr r="0" g="0" b="0"/>
+        </a:effectRef>
+        <a:fontRef idx="minor"/>
+      </dsp:style>
+      <dsp:txBody>
+        <a:bodyPr spcFirstLastPara="0" vert="horz" wrap="square" lIns="118538" tIns="118538" rIns="118538" bIns="118538" numCol="1" spcCol="1270" anchor="ctr" anchorCtr="0">
+          <a:noAutofit/>
+        </a:bodyPr>
+        <a:lstStyle/>
+        <a:p>
+          <a:pPr marL="0" lvl="0" indent="0" algn="l" defTabSz="933450">
+            <a:lnSpc>
+              <a:spcPct val="100000"/>
+            </a:lnSpc>
+            <a:spcBef>
+              <a:spcPct val="0"/>
+            </a:spcBef>
+            <a:spcAft>
+              <a:spcPct val="35000"/>
+            </a:spcAft>
+            <a:buNone/>
+          </a:pPr>
+          <a:r>
+            <a:rPr lang="en-US" sz="2100" kern="1200" dirty="0">
+              <a:solidFill>
+                <a:srgbClr val="E2E2E8">
+                  <a:lumMod val="50000"/>
+                </a:srgbClr>
+              </a:solidFill>
+              <a:latin typeface="Garamond" panose="02020404030301010803"/>
+              <a:ea typeface="+mn-ea"/>
+              <a:cs typeface="+mn-cs"/>
+            </a:rPr>
+            <a:t>Domain-based DFS namespace</a:t>
+          </a:r>
+          <a:endParaRPr lang="ru-RU" sz="2100" kern="1200" dirty="0">
+            <a:solidFill>
+              <a:srgbClr val="E2E2E8">
+                <a:lumMod val="50000"/>
+              </a:srgbClr>
+            </a:solidFill>
+            <a:latin typeface="Garamond" panose="02020404030301010803"/>
+            <a:ea typeface="+mn-ea"/>
+            <a:cs typeface="+mn-cs"/>
+          </a:endParaRPr>
+        </a:p>
+      </dsp:txBody>
+      <dsp:txXfrm>
+        <a:off x="809126" y="2014048"/>
+        <a:ext cx="3754937" cy="1120040"/>
+      </dsp:txXfrm>
+    </dsp:sp>
+  </dsp:spTree>
+</dsp:drawing>
+</file>
+
 <file path=ppt/diagrams/layout1.xml><?xml version="1.0" encoding="utf-8"?>
 <dgm:layoutDef xmlns:dgm="http://schemas.openxmlformats.org/drawingml/2006/diagram" xmlns:a="http://schemas.openxmlformats.org/drawingml/2006/main" uniqueId="urn:microsoft.com/office/officeart/2005/8/layout/default">
   <dgm:title val=""/>
@@ -2031,7 +3417,1335 @@
 </dgm:layoutDef>
 </file>
 
+<file path=ppt/diagrams/layout2.xml><?xml version="1.0" encoding="utf-8"?>
+<dgm:layoutDef xmlns:dgm="http://schemas.openxmlformats.org/drawingml/2006/diagram" xmlns:a="http://schemas.openxmlformats.org/drawingml/2006/main" uniqueId="urn:microsoft.com/office/officeart/2018/2/layout/IconVerticalSolidList">
+  <dgm:title val="Icon Vertical Solid List"/>
+  <dgm:desc val="Use to show a series of visuals from top to bottom with Level 1 or Level 1 and Level 2 text grouped in a shape. Works best with icons or small pictures with lengthier descriptions."/>
+  <dgm:catLst>
+    <dgm:cat type="icon" pri="500"/>
+  </dgm:catLst>
+  <dgm:sampData useDef="1">
+    <dgm:dataModel>
+      <dgm:ptLst/>
+      <dgm:bg/>
+      <dgm:whole/>
+    </dgm:dataModel>
+  </dgm:sampData>
+  <dgm:styleData useDef="1">
+    <dgm:dataModel>
+      <dgm:ptLst/>
+      <dgm:bg/>
+      <dgm:whole/>
+    </dgm:dataModel>
+  </dgm:styleData>
+  <dgm:clrData useDef="1">
+    <dgm:dataModel>
+      <dgm:ptLst/>
+      <dgm:bg/>
+      <dgm:whole/>
+    </dgm:dataModel>
+  </dgm:clrData>
+  <dgm:layoutNode name="root">
+    <dgm:varLst>
+      <dgm:dir/>
+      <dgm:resizeHandles val="exact"/>
+    </dgm:varLst>
+    <dgm:choose name="Name0">
+      <dgm:if name="Name1" axis="self" func="var" arg="dir" op="equ" val="norm">
+        <dgm:alg type="lin">
+          <dgm:param type="linDir" val="fromT"/>
+          <dgm:param type="nodeHorzAlign" val="l"/>
+        </dgm:alg>
+      </dgm:if>
+      <dgm:else name="Name2">
+        <dgm:alg type="lin">
+          <dgm:param type="linDir" val="fromT"/>
+          <dgm:param type="nodeHorzAlign" val="r"/>
+        </dgm:alg>
+      </dgm:else>
+    </dgm:choose>
+    <dgm:shape xmlns:r="http://schemas.openxmlformats.org/officeDocument/2006/relationships" r:blip="">
+      <dgm:adjLst/>
+    </dgm:shape>
+    <dgm:presOf/>
+    <dgm:choose name="Name3">
+      <dgm:if name="Name4" axis="ch" ptType="node" func="cnt" op="lte" val="3">
+        <dgm:constrLst>
+          <dgm:constr type="h" for="ch" forName="compNode" refType="h" fact="0.3"/>
+          <dgm:constr type="w" for="ch" forName="compNode" refType="w"/>
+          <dgm:constr type="h" for="ch" forName="sibTrans" refType="h" refFor="ch" refForName="compNode" fact="0.25"/>
+          <dgm:constr type="primFontSz" for="des" forName="parTx" val="25"/>
+          <dgm:constr type="primFontSz" for="des" forName="desTx" refType="primFontSz" refFor="des" refForName="parTx" op="lte" fact="0.75"/>
+          <dgm:constr type="h" for="des" forName="compNode" op="equ"/>
+          <dgm:constr type="h" for="des" forName="bgRect" op="equ"/>
+          <dgm:constr type="h" for="des" forName="iconRect" op="equ"/>
+          <dgm:constr type="w" for="des" forName="iconRect" op="equ"/>
+          <dgm:constr type="h" for="des" forName="spaceRect" op="equ"/>
+          <dgm:constr type="h" for="des" forName="parTx" op="equ"/>
+          <dgm:constr type="h" for="des" forName="desTx" op="equ"/>
+        </dgm:constrLst>
+      </dgm:if>
+      <dgm:if name="Name5" axis="ch" ptType="node" func="cnt" op="lte" val="4">
+        <dgm:constrLst>
+          <dgm:constr type="h" for="ch" forName="compNode" refType="h" fact="0.3"/>
+          <dgm:constr type="w" for="ch" forName="compNode" refType="w"/>
+          <dgm:constr type="h" for="ch" forName="sibTrans" refType="h" refFor="ch" refForName="compNode" fact="0.25"/>
+          <dgm:constr type="primFontSz" for="des" forName="parTx" val="22"/>
+          <dgm:constr type="primFontSz" for="des" forName="desTx" refType="primFontSz" refFor="des" refForName="parTx" op="lte" fact="0.75"/>
+          <dgm:constr type="h" for="des" forName="compNode" op="equ"/>
+          <dgm:constr type="h" for="des" forName="bgRect" op="equ"/>
+          <dgm:constr type="h" for="des" forName="iconRect" op="equ"/>
+          <dgm:constr type="w" for="des" forName="iconRect" op="equ"/>
+          <dgm:constr type="h" for="des" forName="spaceRect" op="equ"/>
+          <dgm:constr type="h" for="des" forName="parTx" op="equ"/>
+          <dgm:constr type="h" for="des" forName="desTx" op="equ"/>
+        </dgm:constrLst>
+      </dgm:if>
+      <dgm:if name="Name6" axis="ch" ptType="node" func="cnt" op="lte" val="6">
+        <dgm:constrLst>
+          <dgm:constr type="h" for="ch" forName="compNode" refType="h" fact="0.3"/>
+          <dgm:constr type="w" for="ch" forName="compNode" refType="w"/>
+          <dgm:constr type="h" for="ch" forName="sibTrans" refType="h" refFor="ch" refForName="compNode" fact="0.25"/>
+          <dgm:constr type="primFontSz" for="des" forName="parTx" val="19"/>
+          <dgm:constr type="primFontSz" for="des" forName="desTx" refType="primFontSz" refFor="des" refForName="parTx" op="lte" fact="0.75"/>
+          <dgm:constr type="h" for="des" forName="compNode" op="equ"/>
+          <dgm:constr type="h" for="des" forName="bgRect" op="equ"/>
+          <dgm:constr type="h" for="des" forName="iconRect" op="equ"/>
+          <dgm:constr type="w" for="des" forName="iconRect" op="equ"/>
+          <dgm:constr type="h" for="des" forName="spaceRect" op="equ"/>
+          <dgm:constr type="h" for="des" forName="parTx" op="equ"/>
+          <dgm:constr type="h" for="des" forName="desTx" op="equ"/>
+        </dgm:constrLst>
+      </dgm:if>
+      <dgm:else name="Name7">
+        <dgm:constrLst>
+          <dgm:constr type="h" for="ch" forName="compNode" refType="h" fact="0.3"/>
+          <dgm:constr type="w" for="ch" forName="compNode" refType="w"/>
+          <dgm:constr type="h" for="ch" forName="sibTrans" refType="h" refFor="ch" refForName="compNode" fact="0.25"/>
+          <dgm:constr type="primFontSz" for="des" forName="parTx" val="16"/>
+          <dgm:constr type="primFontSz" for="des" forName="desTx" refType="primFontSz" refFor="des" refForName="parTx" op="lte" fact="0.75"/>
+          <dgm:constr type="h" for="des" forName="compNode" op="equ"/>
+          <dgm:constr type="h" for="des" forName="bgRect" op="equ"/>
+          <dgm:constr type="h" for="des" forName="iconRect" op="equ"/>
+          <dgm:constr type="w" for="des" forName="iconRect" op="equ"/>
+          <dgm:constr type="h" for="des" forName="spaceRect" op="equ"/>
+          <dgm:constr type="h" for="des" forName="parTx" op="equ"/>
+          <dgm:constr type="h" for="des" forName="desTx" op="equ"/>
+        </dgm:constrLst>
+      </dgm:else>
+    </dgm:choose>
+    <dgm:ruleLst>
+      <dgm:rule type="h" for="ch" forName="compNode" val="0" fact="NaN" max="NaN"/>
+    </dgm:ruleLst>
+    <dgm:forEach name="Name8" axis="ch" ptType="node">
+      <dgm:layoutNode name="compNode">
+        <dgm:alg type="composite"/>
+        <dgm:shape xmlns:r="http://schemas.openxmlformats.org/officeDocument/2006/relationships" r:blip="">
+          <dgm:adjLst/>
+        </dgm:shape>
+        <dgm:presOf axis="self"/>
+        <dgm:choose name="Name9">
+          <dgm:if name="Name10" axis="ch" ptType="node" func="cnt" op="gte" val="1">
+            <dgm:constrLst>
+              <dgm:constr type="w" for="ch" forName="bgRect" refType="w"/>
+              <dgm:constr type="h" for="ch" forName="bgRect" refType="h"/>
+              <dgm:constr type="l" for="ch" forName="bgRect"/>
+              <dgm:constr type="t" for="ch" forName="bgRect"/>
+              <dgm:constr type="h" for="ch" forName="iconRect" refType="h" fact="0.55"/>
+              <dgm:constr type="w" for="ch" forName="iconRect" refType="h" refFor="ch" refForName="iconRect"/>
+              <dgm:constr type="l" for="ch" forName="iconRect" refType="h" refFor="ch" refForName="iconRect" fact="0.55"/>
+              <dgm:constr type="ctrY" for="ch" forName="iconRect" refType="ctrY" refFor="ch" refForName="bgRect"/>
+              <dgm:constr type="w" for="ch" forName="spaceRect" refType="l" refFor="ch" refForName="iconRect"/>
+              <dgm:constr type="h" for="ch" forName="spaceRect" refType="h"/>
+              <dgm:constr type="l" for="ch" forName="spaceRect" refType="r" refFor="ch" refForName="iconRect"/>
+              <dgm:constr type="t" for="ch" forName="spaceRect"/>
+              <dgm:constr type="w" for="ch" forName="parTx" refType="w" fact="0.45"/>
+              <dgm:constr type="h" for="ch" forName="parTx" refType="h"/>
+              <dgm:constr type="l" for="ch" forName="parTx" refType="r" refFor="ch" refForName="spaceRect"/>
+              <dgm:constr type="t" for="ch" forName="parTx"/>
+              <dgm:constr type="h" for="ch" forName="desTx" refType="h"/>
+              <dgm:constr type="l" for="ch" forName="desTx" refType="r" refFor="ch" refForName="parTx"/>
+              <dgm:constr type="t" for="ch" forName="desTx"/>
+            </dgm:constrLst>
+          </dgm:if>
+          <dgm:else name="Name11">
+            <dgm:constrLst>
+              <dgm:constr type="w" for="ch" forName="bgRect" refType="w"/>
+              <dgm:constr type="h" for="ch" forName="bgRect" refType="h"/>
+              <dgm:constr type="l" for="ch" forName="bgRect"/>
+              <dgm:constr type="t" for="ch" forName="bgRect"/>
+              <dgm:constr type="h" for="ch" forName="iconRect" refType="h" fact="0.55"/>
+              <dgm:constr type="w" for="ch" forName="iconRect" refType="h" refFor="ch" refForName="iconRect"/>
+              <dgm:constr type="l" for="ch" forName="iconRect" refType="h" refFor="ch" refForName="iconRect" fact="0.55"/>
+              <dgm:constr type="ctrY" for="ch" forName="iconRect" refType="ctrY" refFor="ch" refForName="bgRect"/>
+              <dgm:constr type="w" for="ch" forName="spaceRect" refType="l" refFor="ch" refForName="iconRect"/>
+              <dgm:constr type="h" for="ch" forName="spaceRect" refType="h"/>
+              <dgm:constr type="l" for="ch" forName="spaceRect" refType="r" refFor="ch" refForName="iconRect"/>
+              <dgm:constr type="t" for="ch" forName="spaceRect"/>
+              <dgm:constr type="h" for="ch" forName="parTx" refType="h"/>
+              <dgm:constr type="l" for="ch" forName="parTx" refType="r" refFor="ch" refForName="spaceRect"/>
+              <dgm:constr type="t" for="ch" forName="parTx"/>
+            </dgm:constrLst>
+          </dgm:else>
+        </dgm:choose>
+        <dgm:ruleLst>
+          <dgm:rule type="h" val="INF" fact="NaN" max="NaN"/>
+        </dgm:ruleLst>
+        <dgm:layoutNode name="bgRect" styleLbl="bgShp">
+          <dgm:alg type="sp"/>
+          <dgm:shape xmlns:r="http://schemas.openxmlformats.org/officeDocument/2006/relationships" type="roundRect" r:blip="">
+            <dgm:adjLst>
+              <dgm:adj idx="1" val="0.1"/>
+            </dgm:adjLst>
+          </dgm:shape>
+          <dgm:presOf/>
+          <dgm:constrLst/>
+          <dgm:ruleLst/>
+        </dgm:layoutNode>
+        <dgm:layoutNode name="iconRect" styleLbl="node1">
+          <dgm:alg type="sp"/>
+          <dgm:shape xmlns:r="http://schemas.openxmlformats.org/officeDocument/2006/relationships" type="rect" r:blip="" blipPhldr="1">
+            <dgm:adjLst/>
+          </dgm:shape>
+          <dgm:presOf/>
+          <dgm:constrLst/>
+          <dgm:ruleLst/>
+        </dgm:layoutNode>
+        <dgm:layoutNode name="spaceRect">
+          <dgm:alg type="sp"/>
+          <dgm:shape xmlns:r="http://schemas.openxmlformats.org/officeDocument/2006/relationships" r:blip="">
+            <dgm:adjLst/>
+          </dgm:shape>
+          <dgm:presOf/>
+          <dgm:constrLst/>
+          <dgm:ruleLst/>
+        </dgm:layoutNode>
+        <dgm:layoutNode name="parTx" styleLbl="revTx">
+          <dgm:varLst>
+            <dgm:chMax val="0"/>
+            <dgm:chPref val="0"/>
+          </dgm:varLst>
+          <dgm:alg type="tx">
+            <dgm:param type="txAnchorVert" val="mid"/>
+            <dgm:param type="parTxLTRAlign" val="l"/>
+            <dgm:param type="shpTxLTRAlignCh" val="l"/>
+            <dgm:param type="parTxRTLAlign" val="r"/>
+            <dgm:param type="shpTxRTLAlignCh" val="r"/>
+          </dgm:alg>
+          <dgm:shape xmlns:r="http://schemas.openxmlformats.org/officeDocument/2006/relationships" type="rect" r:blip="">
+            <dgm:adjLst/>
+          </dgm:shape>
+          <dgm:presOf axis="self" ptType="node"/>
+          <dgm:constrLst>
+            <dgm:constr type="lMarg" refType="h" fact="0.3"/>
+            <dgm:constr type="rMarg" refType="h" fact="0.3"/>
+            <dgm:constr type="tMarg" refType="h" fact="0.3"/>
+            <dgm:constr type="bMarg" refType="h" fact="0.3"/>
+          </dgm:constrLst>
+          <dgm:ruleLst>
+            <dgm:rule type="primFontSz" val="14" fact="NaN" max="NaN"/>
+            <dgm:rule type="h" val="INF" fact="NaN" max="NaN"/>
+          </dgm:ruleLst>
+        </dgm:layoutNode>
+        <dgm:choose name="Name12">
+          <dgm:if name="Name13" axis="ch" ptType="node" func="cnt" op="gte" val="1">
+            <dgm:layoutNode name="desTx" styleLbl="revTx">
+              <dgm:varLst/>
+              <dgm:alg type="tx">
+                <dgm:param type="txAnchorVertCh" val="mid"/>
+                <dgm:param type="parTxLTRAlign" val="l"/>
+                <dgm:param type="shpTxLTRAlignCh" val="l"/>
+                <dgm:param type="parTxRTLAlign" val="r"/>
+                <dgm:param type="shpTxRTLAlignCh" val="r"/>
+                <dgm:param type="stBulletLvl" val="0"/>
+              </dgm:alg>
+              <dgm:shape xmlns:r="http://schemas.openxmlformats.org/officeDocument/2006/relationships" type="rect" r:blip="">
+                <dgm:adjLst/>
+              </dgm:shape>
+              <dgm:presOf axis="des" ptType="node"/>
+              <dgm:constrLst>
+                <dgm:constr type="primFontSz" val="18"/>
+                <dgm:constr type="secFontSz" refType="primFontSz"/>
+                <dgm:constr type="lMarg" refType="h" fact="0.3"/>
+                <dgm:constr type="rMarg" refType="h" fact="0.3"/>
+                <dgm:constr type="tMarg" refType="h" fact="0.3"/>
+                <dgm:constr type="bMarg" refType="h" fact="0.3"/>
+              </dgm:constrLst>
+              <dgm:ruleLst>
+                <dgm:rule type="primFontSz" val="11" fact="NaN" max="NaN"/>
+              </dgm:ruleLst>
+            </dgm:layoutNode>
+          </dgm:if>
+          <dgm:else name="Name14"/>
+        </dgm:choose>
+      </dgm:layoutNode>
+      <dgm:forEach name="Name15" axis="followSib" ptType="sibTrans" cnt="1">
+        <dgm:layoutNode name="sibTrans">
+          <dgm:alg type="sp"/>
+          <dgm:shape xmlns:r="http://schemas.openxmlformats.org/officeDocument/2006/relationships" r:blip="">
+            <dgm:adjLst/>
+          </dgm:shape>
+          <dgm:presOf axis="self"/>
+          <dgm:constrLst/>
+          <dgm:ruleLst/>
+        </dgm:layoutNode>
+      </dgm:forEach>
+    </dgm:forEach>
+  </dgm:layoutNode>
+  <dgm:extLst>
+    <a:ext uri="{68A01E43-0DF5-4B5B-8FA6-DAF915123BFB}">
+      <dgm1612:lstStyle xmlns:dgm1612="http://schemas.microsoft.com/office/drawing/2016/12/diagram">
+        <a:lvl1pPr>
+          <a:lnSpc>
+            <a:spcPct val="100000"/>
+          </a:lnSpc>
+        </a:lvl1pPr>
+        <a:lvl2pPr>
+          <a:lnSpc>
+            <a:spcPct val="100000"/>
+          </a:lnSpc>
+        </a:lvl2pPr>
+      </dgm1612:lstStyle>
+    </a:ext>
+  </dgm:extLst>
+</dgm:layoutDef>
+</file>
+
 <file path=ppt/diagrams/quickStyle1.xml><?xml version="1.0" encoding="utf-8"?>
+<dgm:styleDef xmlns:dgm="http://schemas.openxmlformats.org/drawingml/2006/diagram" xmlns:a="http://schemas.openxmlformats.org/drawingml/2006/main" uniqueId="urn:microsoft.com/office/officeart/2005/8/quickstyle/simple1">
+  <dgm:title val=""/>
+  <dgm:desc val=""/>
+  <dgm:catLst>
+    <dgm:cat type="simple" pri="10100"/>
+  </dgm:catLst>
+  <dgm:scene3d>
+    <a:camera prst="orthographicFront"/>
+    <a:lightRig rig="threePt" dir="t"/>
+  </dgm:scene3d>
+  <dgm:styleLbl name="node0">
+    <dgm:scene3d>
+      <a:camera prst="orthographicFront"/>
+      <a:lightRig rig="threePt" dir="t"/>
+    </dgm:scene3d>
+    <dgm:sp3d/>
+    <dgm:txPr/>
+    <dgm:style>
+      <a:lnRef idx="2">
+        <a:scrgbClr r="0" g="0" b="0"/>
+      </a:lnRef>
+      <a:fillRef idx="1">
+        <a:scrgbClr r="0" g="0" b="0"/>
+      </a:fillRef>
+      <a:effectRef idx="0">
+        <a:scrgbClr r="0" g="0" b="0"/>
+      </a:effectRef>
+      <a:fontRef idx="minor">
+        <a:schemeClr val="lt1"/>
+      </a:fontRef>
+    </dgm:style>
+  </dgm:styleLbl>
+  <dgm:styleLbl name="lnNode1">
+    <dgm:scene3d>
+      <a:camera prst="orthographicFront"/>
+      <a:lightRig rig="threePt" dir="t"/>
+    </dgm:scene3d>
+    <dgm:sp3d/>
+    <dgm:txPr/>
+    <dgm:style>
+      <a:lnRef idx="2">
+        <a:scrgbClr r="0" g="0" b="0"/>
+      </a:lnRef>
+      <a:fillRef idx="1">
+        <a:scrgbClr r="0" g="0" b="0"/>
+      </a:fillRef>
+      <a:effectRef idx="0">
+        <a:scrgbClr r="0" g="0" b="0"/>
+      </a:effectRef>
+      <a:fontRef idx="minor">
+        <a:schemeClr val="lt1"/>
+      </a:fontRef>
+    </dgm:style>
+  </dgm:styleLbl>
+  <dgm:styleLbl name="vennNode1">
+    <dgm:scene3d>
+      <a:camera prst="orthographicFront"/>
+      <a:lightRig rig="threePt" dir="t"/>
+    </dgm:scene3d>
+    <dgm:sp3d/>
+    <dgm:txPr/>
+    <dgm:style>
+      <a:lnRef idx="2">
+        <a:scrgbClr r="0" g="0" b="0"/>
+      </a:lnRef>
+      <a:fillRef idx="1">
+        <a:scrgbClr r="0" g="0" b="0"/>
+      </a:fillRef>
+      <a:effectRef idx="0">
+        <a:scrgbClr r="0" g="0" b="0"/>
+      </a:effectRef>
+      <a:fontRef idx="minor">
+        <a:schemeClr val="tx1"/>
+      </a:fontRef>
+    </dgm:style>
+  </dgm:styleLbl>
+  <dgm:styleLbl name="alignNode1">
+    <dgm:scene3d>
+      <a:camera prst="orthographicFront"/>
+      <a:lightRig rig="threePt" dir="t"/>
+    </dgm:scene3d>
+    <dgm:sp3d/>
+    <dgm:txPr/>
+    <dgm:style>
+      <a:lnRef idx="2">
+        <a:scrgbClr r="0" g="0" b="0"/>
+      </a:lnRef>
+      <a:fillRef idx="1">
+        <a:scrgbClr r="0" g="0" b="0"/>
+      </a:fillRef>
+      <a:effectRef idx="0">
+        <a:scrgbClr r="0" g="0" b="0"/>
+      </a:effectRef>
+      <a:fontRef idx="minor">
+        <a:schemeClr val="lt1"/>
+      </a:fontRef>
+    </dgm:style>
+  </dgm:styleLbl>
+  <dgm:styleLbl name="node1">
+    <dgm:scene3d>
+      <a:camera prst="orthographicFront"/>
+      <a:lightRig rig="threePt" dir="t"/>
+    </dgm:scene3d>
+    <dgm:sp3d/>
+    <dgm:txPr/>
+    <dgm:style>
+      <a:lnRef idx="2">
+        <a:scrgbClr r="0" g="0" b="0"/>
+      </a:lnRef>
+      <a:fillRef idx="1">
+        <a:scrgbClr r="0" g="0" b="0"/>
+      </a:fillRef>
+      <a:effectRef idx="0">
+        <a:scrgbClr r="0" g="0" b="0"/>
+      </a:effectRef>
+      <a:fontRef idx="minor">
+        <a:schemeClr val="lt1"/>
+      </a:fontRef>
+    </dgm:style>
+  </dgm:styleLbl>
+  <dgm:styleLbl name="node2">
+    <dgm:scene3d>
+      <a:camera prst="orthographicFront"/>
+      <a:lightRig rig="threePt" dir="t"/>
+    </dgm:scene3d>
+    <dgm:sp3d/>
+    <dgm:txPr/>
+    <dgm:style>
+      <a:lnRef idx="2">
+        <a:scrgbClr r="0" g="0" b="0"/>
+      </a:lnRef>
+      <a:fillRef idx="1">
+        <a:scrgbClr r="0" g="0" b="0"/>
+      </a:fillRef>
+      <a:effectRef idx="0">
+        <a:scrgbClr r="0" g="0" b="0"/>
+      </a:effectRef>
+      <a:fontRef idx="minor">
+        <a:schemeClr val="lt1"/>
+      </a:fontRef>
+    </dgm:style>
+  </dgm:styleLbl>
+  <dgm:styleLbl name="node3">
+    <dgm:scene3d>
+      <a:camera prst="orthographicFront"/>
+      <a:lightRig rig="threePt" dir="t"/>
+    </dgm:scene3d>
+    <dgm:sp3d/>
+    <dgm:txPr/>
+    <dgm:style>
+      <a:lnRef idx="2">
+        <a:scrgbClr r="0" g="0" b="0"/>
+      </a:lnRef>
+      <a:fillRef idx="1">
+        <a:scrgbClr r="0" g="0" b="0"/>
+      </a:fillRef>
+      <a:effectRef idx="0">
+        <a:scrgbClr r="0" g="0" b="0"/>
+      </a:effectRef>
+      <a:fontRef idx="minor">
+        <a:schemeClr val="lt1"/>
+      </a:fontRef>
+    </dgm:style>
+  </dgm:styleLbl>
+  <dgm:styleLbl name="node4">
+    <dgm:scene3d>
+      <a:camera prst="orthographicFront"/>
+      <a:lightRig rig="threePt" dir="t"/>
+    </dgm:scene3d>
+    <dgm:sp3d/>
+    <dgm:txPr/>
+    <dgm:style>
+      <a:lnRef idx="2">
+        <a:scrgbClr r="0" g="0" b="0"/>
+      </a:lnRef>
+      <a:fillRef idx="1">
+        <a:scrgbClr r="0" g="0" b="0"/>
+      </a:fillRef>
+      <a:effectRef idx="0">
+        <a:scrgbClr r="0" g="0" b="0"/>
+      </a:effectRef>
+      <a:fontRef idx="minor">
+        <a:schemeClr val="lt1"/>
+      </a:fontRef>
+    </dgm:style>
+  </dgm:styleLbl>
+  <dgm:styleLbl name="fgImgPlace1">
+    <dgm:scene3d>
+      <a:camera prst="orthographicFront"/>
+      <a:lightRig rig="threePt" dir="t"/>
+    </dgm:scene3d>
+    <dgm:sp3d/>
+    <dgm:txPr/>
+    <dgm:style>
+      <a:lnRef idx="2">
+        <a:scrgbClr r="0" g="0" b="0"/>
+      </a:lnRef>
+      <a:fillRef idx="1">
+        <a:scrgbClr r="0" g="0" b="0"/>
+      </a:fillRef>
+      <a:effectRef idx="0">
+        <a:scrgbClr r="0" g="0" b="0"/>
+      </a:effectRef>
+      <a:fontRef idx="minor"/>
+    </dgm:style>
+  </dgm:styleLbl>
+  <dgm:styleLbl name="alignImgPlace1">
+    <dgm:scene3d>
+      <a:camera prst="orthographicFront"/>
+      <a:lightRig rig="threePt" dir="t"/>
+    </dgm:scene3d>
+    <dgm:sp3d/>
+    <dgm:txPr/>
+    <dgm:style>
+      <a:lnRef idx="2">
+        <a:scrgbClr r="0" g="0" b="0"/>
+      </a:lnRef>
+      <a:fillRef idx="1">
+        <a:scrgbClr r="0" g="0" b="0"/>
+      </a:fillRef>
+      <a:effectRef idx="0">
+        <a:scrgbClr r="0" g="0" b="0"/>
+      </a:effectRef>
+      <a:fontRef idx="minor"/>
+    </dgm:style>
+  </dgm:styleLbl>
+  <dgm:styleLbl name="bgImgPlace1">
+    <dgm:scene3d>
+      <a:camera prst="orthographicFront"/>
+      <a:lightRig rig="threePt" dir="t"/>
+    </dgm:scene3d>
+    <dgm:sp3d/>
+    <dgm:txPr/>
+    <dgm:style>
+      <a:lnRef idx="2">
+        <a:scrgbClr r="0" g="0" b="0"/>
+      </a:lnRef>
+      <a:fillRef idx="1">
+        <a:scrgbClr r="0" g="0" b="0"/>
+      </a:fillRef>
+      <a:effectRef idx="0">
+        <a:scrgbClr r="0" g="0" b="0"/>
+      </a:effectRef>
+      <a:fontRef idx="minor"/>
+    </dgm:style>
+  </dgm:styleLbl>
+  <dgm:styleLbl name="sibTrans2D1">
+    <dgm:scene3d>
+      <a:camera prst="orthographicFront"/>
+      <a:lightRig rig="threePt" dir="t"/>
+    </dgm:scene3d>
+    <dgm:sp3d/>
+    <dgm:txPr/>
+    <dgm:style>
+      <a:lnRef idx="0">
+        <a:scrgbClr r="0" g="0" b="0"/>
+      </a:lnRef>
+      <a:fillRef idx="1">
+        <a:scrgbClr r="0" g="0" b="0"/>
+      </a:fillRef>
+      <a:effectRef idx="0">
+        <a:scrgbClr r="0" g="0" b="0"/>
+      </a:effectRef>
+      <a:fontRef idx="minor">
+        <a:schemeClr val="lt1"/>
+      </a:fontRef>
+    </dgm:style>
+  </dgm:styleLbl>
+  <dgm:styleLbl name="fgSibTrans2D1">
+    <dgm:scene3d>
+      <a:camera prst="orthographicFront"/>
+      <a:lightRig rig="threePt" dir="t"/>
+    </dgm:scene3d>
+    <dgm:sp3d/>
+    <dgm:txPr/>
+    <dgm:style>
+      <a:lnRef idx="0">
+        <a:scrgbClr r="0" g="0" b="0"/>
+      </a:lnRef>
+      <a:fillRef idx="1">
+        <a:scrgbClr r="0" g="0" b="0"/>
+      </a:fillRef>
+      <a:effectRef idx="0">
+        <a:scrgbClr r="0" g="0" b="0"/>
+      </a:effectRef>
+      <a:fontRef idx="minor">
+        <a:schemeClr val="lt1"/>
+      </a:fontRef>
+    </dgm:style>
+  </dgm:styleLbl>
+  <dgm:styleLbl name="bgSibTrans2D1">
+    <dgm:scene3d>
+      <a:camera prst="orthographicFront"/>
+      <a:lightRig rig="threePt" dir="t"/>
+    </dgm:scene3d>
+    <dgm:sp3d/>
+    <dgm:txPr/>
+    <dgm:style>
+      <a:lnRef idx="0">
+        <a:scrgbClr r="0" g="0" b="0"/>
+      </a:lnRef>
+      <a:fillRef idx="1">
+        <a:scrgbClr r="0" g="0" b="0"/>
+      </a:fillRef>
+      <a:effectRef idx="0">
+        <a:scrgbClr r="0" g="0" b="0"/>
+      </a:effectRef>
+      <a:fontRef idx="minor">
+        <a:schemeClr val="lt1"/>
+      </a:fontRef>
+    </dgm:style>
+  </dgm:styleLbl>
+  <dgm:styleLbl name="sibTrans1D1">
+    <dgm:scene3d>
+      <a:camera prst="orthographicFront"/>
+      <a:lightRig rig="threePt" dir="t"/>
+    </dgm:scene3d>
+    <dgm:sp3d/>
+    <dgm:txPr/>
+    <dgm:style>
+      <a:lnRef idx="1">
+        <a:scrgbClr r="0" g="0" b="0"/>
+      </a:lnRef>
+      <a:fillRef idx="0">
+        <a:scrgbClr r="0" g="0" b="0"/>
+      </a:fillRef>
+      <a:effectRef idx="0">
+        <a:scrgbClr r="0" g="0" b="0"/>
+      </a:effectRef>
+      <a:fontRef idx="minor"/>
+    </dgm:style>
+  </dgm:styleLbl>
+  <dgm:styleLbl name="callout">
+    <dgm:scene3d>
+      <a:camera prst="orthographicFront"/>
+      <a:lightRig rig="threePt" dir="t"/>
+    </dgm:scene3d>
+    <dgm:sp3d/>
+    <dgm:txPr/>
+    <dgm:style>
+      <a:lnRef idx="2">
+        <a:scrgbClr r="0" g="0" b="0"/>
+      </a:lnRef>
+      <a:fillRef idx="1">
+        <a:scrgbClr r="0" g="0" b="0"/>
+      </a:fillRef>
+      <a:effectRef idx="0">
+        <a:scrgbClr r="0" g="0" b="0"/>
+      </a:effectRef>
+      <a:fontRef idx="minor"/>
+    </dgm:style>
+  </dgm:styleLbl>
+  <dgm:styleLbl name="asst0">
+    <dgm:scene3d>
+      <a:camera prst="orthographicFront"/>
+      <a:lightRig rig="threePt" dir="t"/>
+    </dgm:scene3d>
+    <dgm:sp3d/>
+    <dgm:txPr/>
+    <dgm:style>
+      <a:lnRef idx="2">
+        <a:scrgbClr r="0" g="0" b="0"/>
+      </a:lnRef>
+      <a:fillRef idx="1">
+        <a:scrgbClr r="0" g="0" b="0"/>
+      </a:fillRef>
+      <a:effectRef idx="0">
+        <a:scrgbClr r="0" g="0" b="0"/>
+      </a:effectRef>
+      <a:fontRef idx="minor">
+        <a:schemeClr val="lt1"/>
+      </a:fontRef>
+    </dgm:style>
+  </dgm:styleLbl>
+  <dgm:styleLbl name="asst1">
+    <dgm:scene3d>
+      <a:camera prst="orthographicFront"/>
+      <a:lightRig rig="threePt" dir="t"/>
+    </dgm:scene3d>
+    <dgm:sp3d/>
+    <dgm:txPr/>
+    <dgm:style>
+      <a:lnRef idx="2">
+        <a:scrgbClr r="0" g="0" b="0"/>
+      </a:lnRef>
+      <a:fillRef idx="1">
+        <a:scrgbClr r="0" g="0" b="0"/>
+      </a:fillRef>
+      <a:effectRef idx="0">
+        <a:scrgbClr r="0" g="0" b="0"/>
+      </a:effectRef>
+      <a:fontRef idx="minor">
+        <a:schemeClr val="lt1"/>
+      </a:fontRef>
+    </dgm:style>
+  </dgm:styleLbl>
+  <dgm:styleLbl name="asst2">
+    <dgm:scene3d>
+      <a:camera prst="orthographicFront"/>
+      <a:lightRig rig="threePt" dir="t"/>
+    </dgm:scene3d>
+    <dgm:sp3d/>
+    <dgm:txPr/>
+    <dgm:style>
+      <a:lnRef idx="2">
+        <a:scrgbClr r="0" g="0" b="0"/>
+      </a:lnRef>
+      <a:fillRef idx="1">
+        <a:scrgbClr r="0" g="0" b="0"/>
+      </a:fillRef>
+      <a:effectRef idx="0">
+        <a:scrgbClr r="0" g="0" b="0"/>
+      </a:effectRef>
+      <a:fontRef idx="minor">
+        <a:schemeClr val="lt1"/>
+      </a:fontRef>
+    </dgm:style>
+  </dgm:styleLbl>
+  <dgm:styleLbl name="asst3">
+    <dgm:scene3d>
+      <a:camera prst="orthographicFront"/>
+      <a:lightRig rig="threePt" dir="t"/>
+    </dgm:scene3d>
+    <dgm:sp3d/>
+    <dgm:txPr/>
+    <dgm:style>
+      <a:lnRef idx="2">
+        <a:scrgbClr r="0" g="0" b="0"/>
+      </a:lnRef>
+      <a:fillRef idx="1">
+        <a:scrgbClr r="0" g="0" b="0"/>
+      </a:fillRef>
+      <a:effectRef idx="0">
+        <a:scrgbClr r="0" g="0" b="0"/>
+      </a:effectRef>
+      <a:fontRef idx="minor">
+        <a:schemeClr val="lt1"/>
+      </a:fontRef>
+    </dgm:style>
+  </dgm:styleLbl>
+  <dgm:styleLbl name="asst4">
+    <dgm:scene3d>
+      <a:camera prst="orthographicFront"/>
+      <a:lightRig rig="threePt" dir="t"/>
+    </dgm:scene3d>
+    <dgm:sp3d/>
+    <dgm:txPr/>
+    <dgm:style>
+      <a:lnRef idx="2">
+        <a:scrgbClr r="0" g="0" b="0"/>
+      </a:lnRef>
+      <a:fillRef idx="1">
+        <a:scrgbClr r="0" g="0" b="0"/>
+      </a:fillRef>
+      <a:effectRef idx="0">
+        <a:scrgbClr r="0" g="0" b="0"/>
+      </a:effectRef>
+      <a:fontRef idx="minor">
+        <a:schemeClr val="lt1"/>
+      </a:fontRef>
+    </dgm:style>
+  </dgm:styleLbl>
+  <dgm:styleLbl name="parChTrans2D1">
+    <dgm:scene3d>
+      <a:camera prst="orthographicFront"/>
+      <a:lightRig rig="threePt" dir="t"/>
+    </dgm:scene3d>
+    <dgm:sp3d/>
+    <dgm:txPr/>
+    <dgm:style>
+      <a:lnRef idx="2">
+        <a:scrgbClr r="0" g="0" b="0"/>
+      </a:lnRef>
+      <a:fillRef idx="1">
+        <a:scrgbClr r="0" g="0" b="0"/>
+      </a:fillRef>
+      <a:effectRef idx="0">
+        <a:scrgbClr r="0" g="0" b="0"/>
+      </a:effectRef>
+      <a:fontRef idx="minor">
+        <a:schemeClr val="lt1"/>
+      </a:fontRef>
+    </dgm:style>
+  </dgm:styleLbl>
+  <dgm:styleLbl name="parChTrans2D2">
+    <dgm:scene3d>
+      <a:camera prst="orthographicFront"/>
+      <a:lightRig rig="threePt" dir="t"/>
+    </dgm:scene3d>
+    <dgm:sp3d/>
+    <dgm:txPr/>
+    <dgm:style>
+      <a:lnRef idx="2">
+        <a:scrgbClr r="0" g="0" b="0"/>
+      </a:lnRef>
+      <a:fillRef idx="1">
+        <a:scrgbClr r="0" g="0" b="0"/>
+      </a:fillRef>
+      <a:effectRef idx="0">
+        <a:scrgbClr r="0" g="0" b="0"/>
+      </a:effectRef>
+      <a:fontRef idx="minor">
+        <a:schemeClr val="lt1"/>
+      </a:fontRef>
+    </dgm:style>
+  </dgm:styleLbl>
+  <dgm:styleLbl name="parChTrans2D3">
+    <dgm:scene3d>
+      <a:camera prst="orthographicFront"/>
+      <a:lightRig rig="threePt" dir="t"/>
+    </dgm:scene3d>
+    <dgm:sp3d/>
+    <dgm:txPr/>
+    <dgm:style>
+      <a:lnRef idx="2">
+        <a:scrgbClr r="0" g="0" b="0"/>
+      </a:lnRef>
+      <a:fillRef idx="1">
+        <a:scrgbClr r="0" g="0" b="0"/>
+      </a:fillRef>
+      <a:effectRef idx="0">
+        <a:scrgbClr r="0" g="0" b="0"/>
+      </a:effectRef>
+      <a:fontRef idx="minor">
+        <a:schemeClr val="lt1"/>
+      </a:fontRef>
+    </dgm:style>
+  </dgm:styleLbl>
+  <dgm:styleLbl name="parChTrans2D4">
+    <dgm:scene3d>
+      <a:camera prst="orthographicFront"/>
+      <a:lightRig rig="threePt" dir="t"/>
+    </dgm:scene3d>
+    <dgm:sp3d/>
+    <dgm:txPr/>
+    <dgm:style>
+      <a:lnRef idx="2">
+        <a:scrgbClr r="0" g="0" b="0"/>
+      </a:lnRef>
+      <a:fillRef idx="1">
+        <a:scrgbClr r="0" g="0" b="0"/>
+      </a:fillRef>
+      <a:effectRef idx="0">
+        <a:scrgbClr r="0" g="0" b="0"/>
+      </a:effectRef>
+      <a:fontRef idx="minor">
+        <a:schemeClr val="lt1"/>
+      </a:fontRef>
+    </dgm:style>
+  </dgm:styleLbl>
+  <dgm:styleLbl name="parChTrans1D1">
+    <dgm:scene3d>
+      <a:camera prst="orthographicFront"/>
+      <a:lightRig rig="threePt" dir="t"/>
+    </dgm:scene3d>
+    <dgm:sp3d/>
+    <dgm:txPr/>
+    <dgm:style>
+      <a:lnRef idx="2">
+        <a:scrgbClr r="0" g="0" b="0"/>
+      </a:lnRef>
+      <a:fillRef idx="0">
+        <a:scrgbClr r="0" g="0" b="0"/>
+      </a:fillRef>
+      <a:effectRef idx="0">
+        <a:scrgbClr r="0" g="0" b="0"/>
+      </a:effectRef>
+      <a:fontRef idx="minor"/>
+    </dgm:style>
+  </dgm:styleLbl>
+  <dgm:styleLbl name="parChTrans1D2">
+    <dgm:scene3d>
+      <a:camera prst="orthographicFront"/>
+      <a:lightRig rig="threePt" dir="t"/>
+    </dgm:scene3d>
+    <dgm:sp3d/>
+    <dgm:txPr/>
+    <dgm:style>
+      <a:lnRef idx="2">
+        <a:scrgbClr r="0" g="0" b="0"/>
+      </a:lnRef>
+      <a:fillRef idx="0">
+        <a:scrgbClr r="0" g="0" b="0"/>
+      </a:fillRef>
+      <a:effectRef idx="0">
+        <a:scrgbClr r="0" g="0" b="0"/>
+      </a:effectRef>
+      <a:fontRef idx="minor"/>
+    </dgm:style>
+  </dgm:styleLbl>
+  <dgm:styleLbl name="parChTrans1D3">
+    <dgm:scene3d>
+      <a:camera prst="orthographicFront"/>
+      <a:lightRig rig="threePt" dir="t"/>
+    </dgm:scene3d>
+    <dgm:sp3d/>
+    <dgm:txPr/>
+    <dgm:style>
+      <a:lnRef idx="2">
+        <a:scrgbClr r="0" g="0" b="0"/>
+      </a:lnRef>
+      <a:fillRef idx="0">
+        <a:scrgbClr r="0" g="0" b="0"/>
+      </a:fillRef>
+      <a:effectRef idx="0">
+        <a:scrgbClr r="0" g="0" b="0"/>
+      </a:effectRef>
+      <a:fontRef idx="minor"/>
+    </dgm:style>
+  </dgm:styleLbl>
+  <dgm:styleLbl name="parChTrans1D4">
+    <dgm:scene3d>
+      <a:camera prst="orthographicFront"/>
+      <a:lightRig rig="threePt" dir="t"/>
+    </dgm:scene3d>
+    <dgm:sp3d/>
+    <dgm:txPr/>
+    <dgm:style>
+      <a:lnRef idx="2">
+        <a:scrgbClr r="0" g="0" b="0"/>
+      </a:lnRef>
+      <a:fillRef idx="0">
+        <a:scrgbClr r="0" g="0" b="0"/>
+      </a:fillRef>
+      <a:effectRef idx="0">
+        <a:scrgbClr r="0" g="0" b="0"/>
+      </a:effectRef>
+      <a:fontRef idx="minor"/>
+    </dgm:style>
+  </dgm:styleLbl>
+  <dgm:styleLbl name="fgAcc1">
+    <dgm:scene3d>
+      <a:camera prst="orthographicFront"/>
+      <a:lightRig rig="threePt" dir="t"/>
+    </dgm:scene3d>
+    <dgm:sp3d/>
+    <dgm:txPr/>
+    <dgm:style>
+      <a:lnRef idx="2">
+        <a:scrgbClr r="0" g="0" b="0"/>
+      </a:lnRef>
+      <a:fillRef idx="1">
+        <a:scrgbClr r="0" g="0" b="0"/>
+      </a:fillRef>
+      <a:effectRef idx="0">
+        <a:scrgbClr r="0" g="0" b="0"/>
+      </a:effectRef>
+      <a:fontRef idx="minor"/>
+    </dgm:style>
+  </dgm:styleLbl>
+  <dgm:styleLbl name="conFgAcc1">
+    <dgm:scene3d>
+      <a:camera prst="orthographicFront"/>
+      <a:lightRig rig="threePt" dir="t"/>
+    </dgm:scene3d>
+    <dgm:sp3d/>
+    <dgm:txPr/>
+    <dgm:style>
+      <a:lnRef idx="2">
+        <a:scrgbClr r="0" g="0" b="0"/>
+      </a:lnRef>
+      <a:fillRef idx="1">
+        <a:scrgbClr r="0" g="0" b="0"/>
+      </a:fillRef>
+      <a:effectRef idx="0">
+        <a:scrgbClr r="0" g="0" b="0"/>
+      </a:effectRef>
+      <a:fontRef idx="minor"/>
+    </dgm:style>
+  </dgm:styleLbl>
+  <dgm:styleLbl name="alignAcc1">
+    <dgm:scene3d>
+      <a:camera prst="orthographicFront"/>
+      <a:lightRig rig="threePt" dir="t"/>
+    </dgm:scene3d>
+    <dgm:sp3d/>
+    <dgm:txPr/>
+    <dgm:style>
+      <a:lnRef idx="2">
+        <a:scrgbClr r="0" g="0" b="0"/>
+      </a:lnRef>
+      <a:fillRef idx="1">
+        <a:scrgbClr r="0" g="0" b="0"/>
+      </a:fillRef>
+      <a:effectRef idx="0">
+        <a:scrgbClr r="0" g="0" b="0"/>
+      </a:effectRef>
+      <a:fontRef idx="minor"/>
+    </dgm:style>
+  </dgm:styleLbl>
+  <dgm:styleLbl name="trAlignAcc1">
+    <dgm:scene3d>
+      <a:camera prst="orthographicFront"/>
+      <a:lightRig rig="threePt" dir="t"/>
+    </dgm:scene3d>
+    <dgm:sp3d/>
+    <dgm:txPr/>
+    <dgm:style>
+      <a:lnRef idx="1">
+        <a:scrgbClr r="0" g="0" b="0"/>
+      </a:lnRef>
+      <a:fillRef idx="1">
+        <a:scrgbClr r="0" g="0" b="0"/>
+      </a:fillRef>
+      <a:effectRef idx="0">
+        <a:scrgbClr r="0" g="0" b="0"/>
+      </a:effectRef>
+      <a:fontRef idx="minor"/>
+    </dgm:style>
+  </dgm:styleLbl>
+  <dgm:styleLbl name="bgAcc1">
+    <dgm:scene3d>
+      <a:camera prst="orthographicFront"/>
+      <a:lightRig rig="threePt" dir="t"/>
+    </dgm:scene3d>
+    <dgm:sp3d/>
+    <dgm:txPr/>
+    <dgm:style>
+      <a:lnRef idx="2">
+        <a:scrgbClr r="0" g="0" b="0"/>
+      </a:lnRef>
+      <a:fillRef idx="1">
+        <a:scrgbClr r="0" g="0" b="0"/>
+      </a:fillRef>
+      <a:effectRef idx="0">
+        <a:scrgbClr r="0" g="0" b="0"/>
+      </a:effectRef>
+      <a:fontRef idx="minor"/>
+    </dgm:style>
+  </dgm:styleLbl>
+  <dgm:styleLbl name="solidFgAcc1">
+    <dgm:scene3d>
+      <a:camera prst="orthographicFront"/>
+      <a:lightRig rig="threePt" dir="t"/>
+    </dgm:scene3d>
+    <dgm:sp3d/>
+    <dgm:txPr/>
+    <dgm:style>
+      <a:lnRef idx="2">
+        <a:scrgbClr r="0" g="0" b="0"/>
+      </a:lnRef>
+      <a:fillRef idx="1">
+        <a:scrgbClr r="0" g="0" b="0"/>
+      </a:fillRef>
+      <a:effectRef idx="0">
+        <a:scrgbClr r="0" g="0" b="0"/>
+      </a:effectRef>
+      <a:fontRef idx="minor"/>
+    </dgm:style>
+  </dgm:styleLbl>
+  <dgm:styleLbl name="solidAlignAcc1">
+    <dgm:scene3d>
+      <a:camera prst="orthographicFront"/>
+      <a:lightRig rig="threePt" dir="t"/>
+    </dgm:scene3d>
+    <dgm:sp3d/>
+    <dgm:txPr/>
+    <dgm:style>
+      <a:lnRef idx="2">
+        <a:scrgbClr r="0" g="0" b="0"/>
+      </a:lnRef>
+      <a:fillRef idx="1">
+        <a:scrgbClr r="0" g="0" b="0"/>
+      </a:fillRef>
+      <a:effectRef idx="0">
+        <a:scrgbClr r="0" g="0" b="0"/>
+      </a:effectRef>
+      <a:fontRef idx="minor"/>
+    </dgm:style>
+  </dgm:styleLbl>
+  <dgm:styleLbl name="solidBgAcc1">
+    <dgm:scene3d>
+      <a:camera prst="orthographicFront"/>
+      <a:lightRig rig="threePt" dir="t"/>
+    </dgm:scene3d>
+    <dgm:sp3d/>
+    <dgm:txPr/>
+    <dgm:style>
+      <a:lnRef idx="2">
+        <a:scrgbClr r="0" g="0" b="0"/>
+      </a:lnRef>
+      <a:fillRef idx="1">
+        <a:scrgbClr r="0" g="0" b="0"/>
+      </a:fillRef>
+      <a:effectRef idx="0">
+        <a:scrgbClr r="0" g="0" b="0"/>
+      </a:effectRef>
+      <a:fontRef idx="minor"/>
+    </dgm:style>
+  </dgm:styleLbl>
+  <dgm:styleLbl name="fgAccFollowNode1">
+    <dgm:scene3d>
+      <a:camera prst="orthographicFront"/>
+      <a:lightRig rig="threePt" dir="t"/>
+    </dgm:scene3d>
+    <dgm:sp3d/>
+    <dgm:txPr/>
+    <dgm:style>
+      <a:lnRef idx="2">
+        <a:scrgbClr r="0" g="0" b="0"/>
+      </a:lnRef>
+      <a:fillRef idx="1">
+        <a:scrgbClr r="0" g="0" b="0"/>
+      </a:fillRef>
+      <a:effectRef idx="0">
+        <a:scrgbClr r="0" g="0" b="0"/>
+      </a:effectRef>
+      <a:fontRef idx="minor"/>
+    </dgm:style>
+  </dgm:styleLbl>
+  <dgm:styleLbl name="alignAccFollowNode1">
+    <dgm:scene3d>
+      <a:camera prst="orthographicFront"/>
+      <a:lightRig rig="threePt" dir="t"/>
+    </dgm:scene3d>
+    <dgm:sp3d/>
+    <dgm:txPr/>
+    <dgm:style>
+      <a:lnRef idx="2">
+        <a:scrgbClr r="0" g="0" b="0"/>
+      </a:lnRef>
+      <a:fillRef idx="1">
+        <a:scrgbClr r="0" g="0" b="0"/>
+      </a:fillRef>
+      <a:effectRef idx="0">
+        <a:scrgbClr r="0" g="0" b="0"/>
+      </a:effectRef>
+      <a:fontRef idx="minor"/>
+    </dgm:style>
+  </dgm:styleLbl>
+  <dgm:styleLbl name="bgAccFollowNode1">
+    <dgm:scene3d>
+      <a:camera prst="orthographicFront"/>
+      <a:lightRig rig="threePt" dir="t"/>
+    </dgm:scene3d>
+    <dgm:sp3d/>
+    <dgm:txPr/>
+    <dgm:style>
+      <a:lnRef idx="2">
+        <a:scrgbClr r="0" g="0" b="0"/>
+      </a:lnRef>
+      <a:fillRef idx="1">
+        <a:scrgbClr r="0" g="0" b="0"/>
+      </a:fillRef>
+      <a:effectRef idx="0">
+        <a:scrgbClr r="0" g="0" b="0"/>
+      </a:effectRef>
+      <a:fontRef idx="minor"/>
+    </dgm:style>
+  </dgm:styleLbl>
+  <dgm:styleLbl name="fgAcc0">
+    <dgm:scene3d>
+      <a:camera prst="orthographicFront"/>
+      <a:lightRig rig="threePt" dir="t"/>
+    </dgm:scene3d>
+    <dgm:sp3d/>
+    <dgm:txPr/>
+    <dgm:style>
+      <a:lnRef idx="2">
+        <a:scrgbClr r="0" g="0" b="0"/>
+      </a:lnRef>
+      <a:fillRef idx="1">
+        <a:scrgbClr r="0" g="0" b="0"/>
+      </a:fillRef>
+      <a:effectRef idx="0">
+        <a:scrgbClr r="0" g="0" b="0"/>
+      </a:effectRef>
+      <a:fontRef idx="minor"/>
+    </dgm:style>
+  </dgm:styleLbl>
+  <dgm:styleLbl name="fgAcc2">
+    <dgm:scene3d>
+      <a:camera prst="orthographicFront"/>
+      <a:lightRig rig="threePt" dir="t"/>
+    </dgm:scene3d>
+    <dgm:sp3d/>
+    <dgm:txPr/>
+    <dgm:style>
+      <a:lnRef idx="2">
+        <a:scrgbClr r="0" g="0" b="0"/>
+      </a:lnRef>
+      <a:fillRef idx="1">
+        <a:scrgbClr r="0" g="0" b="0"/>
+      </a:fillRef>
+      <a:effectRef idx="0">
+        <a:scrgbClr r="0" g="0" b="0"/>
+      </a:effectRef>
+      <a:fontRef idx="minor"/>
+    </dgm:style>
+  </dgm:styleLbl>
+  <dgm:styleLbl name="fgAcc3">
+    <dgm:scene3d>
+      <a:camera prst="orthographicFront"/>
+      <a:lightRig rig="threePt" dir="t"/>
+    </dgm:scene3d>
+    <dgm:sp3d/>
+    <dgm:txPr/>
+    <dgm:style>
+      <a:lnRef idx="2">
+        <a:scrgbClr r="0" g="0" b="0"/>
+      </a:lnRef>
+      <a:fillRef idx="1">
+        <a:scrgbClr r="0" g="0" b="0"/>
+      </a:fillRef>
+      <a:effectRef idx="0">
+        <a:scrgbClr r="0" g="0" b="0"/>
+      </a:effectRef>
+      <a:fontRef idx="minor"/>
+    </dgm:style>
+  </dgm:styleLbl>
+  <dgm:styleLbl name="fgAcc4">
+    <dgm:scene3d>
+      <a:camera prst="orthographicFront"/>
+      <a:lightRig rig="threePt" dir="t"/>
+    </dgm:scene3d>
+    <dgm:sp3d/>
+    <dgm:txPr/>
+    <dgm:style>
+      <a:lnRef idx="2">
+        <a:scrgbClr r="0" g="0" b="0"/>
+      </a:lnRef>
+      <a:fillRef idx="1">
+        <a:scrgbClr r="0" g="0" b="0"/>
+      </a:fillRef>
+      <a:effectRef idx="0">
+        <a:scrgbClr r="0" g="0" b="0"/>
+      </a:effectRef>
+      <a:fontRef idx="minor"/>
+    </dgm:style>
+  </dgm:styleLbl>
+  <dgm:styleLbl name="bgShp">
+    <dgm:scene3d>
+      <a:camera prst="orthographicFront"/>
+      <a:lightRig rig="threePt" dir="t"/>
+    </dgm:scene3d>
+    <dgm:sp3d/>
+    <dgm:txPr/>
+    <dgm:style>
+      <a:lnRef idx="0">
+        <a:scrgbClr r="0" g="0" b="0"/>
+      </a:lnRef>
+      <a:fillRef idx="1">
+        <a:scrgbClr r="0" g="0" b="0"/>
+      </a:fillRef>
+      <a:effectRef idx="0">
+        <a:scrgbClr r="0" g="0" b="0"/>
+      </a:effectRef>
+      <a:fontRef idx="minor"/>
+    </dgm:style>
+  </dgm:styleLbl>
+  <dgm:styleLbl name="dkBgShp">
+    <dgm:scene3d>
+      <a:camera prst="orthographicFront"/>
+      <a:lightRig rig="threePt" dir="t"/>
+    </dgm:scene3d>
+    <dgm:sp3d/>
+    <dgm:txPr/>
+    <dgm:style>
+      <a:lnRef idx="0">
+        <a:scrgbClr r="0" g="0" b="0"/>
+      </a:lnRef>
+      <a:fillRef idx="1">
+        <a:scrgbClr r="0" g="0" b="0"/>
+      </a:fillRef>
+      <a:effectRef idx="0">
+        <a:scrgbClr r="0" g="0" b="0"/>
+      </a:effectRef>
+      <a:fontRef idx="minor"/>
+    </dgm:style>
+  </dgm:styleLbl>
+  <dgm:styleLbl name="trBgShp">
+    <dgm:scene3d>
+      <a:camera prst="orthographicFront"/>
+      <a:lightRig rig="threePt" dir="t"/>
+    </dgm:scene3d>
+    <dgm:sp3d/>
+    <dgm:txPr/>
+    <dgm:style>
+      <a:lnRef idx="0">
+        <a:scrgbClr r="0" g="0" b="0"/>
+      </a:lnRef>
+      <a:fillRef idx="1">
+        <a:scrgbClr r="0" g="0" b="0"/>
+      </a:fillRef>
+      <a:effectRef idx="0">
+        <a:scrgbClr r="0" g="0" b="0"/>
+      </a:effectRef>
+      <a:fontRef idx="minor"/>
+    </dgm:style>
+  </dgm:styleLbl>
+  <dgm:styleLbl name="fgShp">
+    <dgm:scene3d>
+      <a:camera prst="orthographicFront"/>
+      <a:lightRig rig="threePt" dir="t"/>
+    </dgm:scene3d>
+    <dgm:sp3d/>
+    <dgm:txPr/>
+    <dgm:style>
+      <a:lnRef idx="2">
+        <a:scrgbClr r="0" g="0" b="0"/>
+      </a:lnRef>
+      <a:fillRef idx="1">
+        <a:scrgbClr r="0" g="0" b="0"/>
+      </a:fillRef>
+      <a:effectRef idx="0">
+        <a:scrgbClr r="0" g="0" b="0"/>
+      </a:effectRef>
+      <a:fontRef idx="minor"/>
+    </dgm:style>
+  </dgm:styleLbl>
+  <dgm:styleLbl name="revTx">
+    <dgm:scene3d>
+      <a:camera prst="orthographicFront"/>
+      <a:lightRig rig="threePt" dir="t"/>
+    </dgm:scene3d>
+    <dgm:sp3d/>
+    <dgm:txPr/>
+    <dgm:style>
+      <a:lnRef idx="0">
+        <a:scrgbClr r="0" g="0" b="0"/>
+      </a:lnRef>
+      <a:fillRef idx="0">
+        <a:scrgbClr r="0" g="0" b="0"/>
+      </a:fillRef>
+      <a:effectRef idx="0">
+        <a:scrgbClr r="0" g="0" b="0"/>
+      </a:effectRef>
+      <a:fontRef idx="minor"/>
+    </dgm:style>
+  </dgm:styleLbl>
+</dgm:styleDef>
+</file>
+
+<file path=ppt/diagrams/quickStyle2.xml><?xml version="1.0" encoding="utf-8"?>
 <dgm:styleDef xmlns:dgm="http://schemas.openxmlformats.org/drawingml/2006/diagram" xmlns:a="http://schemas.openxmlformats.org/drawingml/2006/main" uniqueId="urn:microsoft.com/office/officeart/2005/8/quickstyle/simple1">
   <dgm:title val=""/>
   <dgm:desc val=""/>
@@ -3722,6 +6436,95 @@
 </p:notes>
 </file>
 
+<file path=ppt/notesSlides/notesSlide4.xml><?xml version="1.0" encoding="utf-8"?>
+<p:notes xmlns:a="http://schemas.openxmlformats.org/drawingml/2006/main" xmlns:r="http://schemas.openxmlformats.org/officeDocument/2006/relationships" xmlns:p="http://schemas.openxmlformats.org/presentationml/2006/main">
+  <p:cSld>
+    <p:spTree>
+      <p:nvGrpSpPr>
+        <p:cNvPr id="1" name=""/>
+        <p:cNvGrpSpPr/>
+        <p:nvPr/>
+      </p:nvGrpSpPr>
+      <p:grpSpPr>
+        <a:xfrm>
+          <a:off x="0" y="0"/>
+          <a:ext cx="0" cy="0"/>
+          <a:chOff x="0" y="0"/>
+          <a:chExt cx="0" cy="0"/>
+        </a:xfrm>
+      </p:grpSpPr>
+      <p:sp>
+        <p:nvSpPr>
+          <p:cNvPr id="2" name="Slide Image Placeholder 1"/>
+          <p:cNvSpPr>
+            <a:spLocks noGrp="1" noRot="1" noChangeAspect="1"/>
+          </p:cNvSpPr>
+          <p:nvPr>
+            <p:ph type="sldImg"/>
+          </p:nvPr>
+        </p:nvSpPr>
+        <p:spPr>
+          <a:xfrm>
+            <a:off x="217488" y="812800"/>
+            <a:ext cx="7124700" cy="4008438"/>
+          </a:xfrm>
+        </p:spPr>
+      </p:sp>
+      <p:sp>
+        <p:nvSpPr>
+          <p:cNvPr id="3" name="Notes Placeholder 2"/>
+          <p:cNvSpPr>
+            <a:spLocks noGrp="1"/>
+          </p:cNvSpPr>
+          <p:nvPr>
+            <p:ph type="body" idx="1"/>
+          </p:nvPr>
+        </p:nvSpPr>
+        <p:spPr/>
+        <p:txBody>
+          <a:bodyPr/>
+          <a:lstStyle/>
+          <a:p>
+            <a:endParaRPr lang="en-US" dirty="0"/>
+          </a:p>
+        </p:txBody>
+      </p:sp>
+      <p:sp>
+        <p:nvSpPr>
+          <p:cNvPr id="4" name="Slide Number Placeholder 3"/>
+          <p:cNvSpPr>
+            <a:spLocks noGrp="1"/>
+          </p:cNvSpPr>
+          <p:nvPr>
+            <p:ph type="sldNum" sz="quarter" idx="5"/>
+          </p:nvPr>
+        </p:nvSpPr>
+        <p:spPr/>
+        <p:txBody>
+          <a:bodyPr/>
+          <a:lstStyle/>
+          <a:p>
+            <a:fld id="{AABE9C73-6CDE-45E2-97F8-E3C5308FA232}" type="slidenum">
+              <a:rPr lang="en-US" smtClean="0"/>
+              <a:t>4</a:t>
+            </a:fld>
+            <a:endParaRPr lang="en-US" dirty="0"/>
+          </a:p>
+        </p:txBody>
+      </p:sp>
+    </p:spTree>
+    <p:extLst>
+      <p:ext uri="{BB962C8B-B14F-4D97-AF65-F5344CB8AC3E}">
+        <p14:creationId xmlns:p14="http://schemas.microsoft.com/office/powerpoint/2010/main" val="4088854541"/>
+      </p:ext>
+    </p:extLst>
+  </p:cSld>
+  <p:clrMapOvr>
+    <a:masterClrMapping/>
+  </p:clrMapOvr>
+</p:notes>
+</file>
+
 <file path=ppt/slideLayouts/slideLayout1.xml><?xml version="1.0" encoding="utf-8"?>
 <p:sldLayout xmlns:a="http://schemas.openxmlformats.org/drawingml/2006/main" xmlns:r="http://schemas.openxmlformats.org/officeDocument/2006/relationships" xmlns:p="http://schemas.openxmlformats.org/presentationml/2006/main" type="blank" preserve="1">
   <p:cSld name="Blank Slide">
@@ -7980,6 +10783,297 @@
     <p:extLst>
       <p:ext uri="{BB962C8B-B14F-4D97-AF65-F5344CB8AC3E}">
         <p14:creationId xmlns:p14="http://schemas.microsoft.com/office/powerpoint/2010/main" val="1040563460"/>
+      </p:ext>
+    </p:extLst>
+  </p:cSld>
+  <p:clrMapOvr>
+    <a:masterClrMapping/>
+  </p:clrMapOvr>
+</p:sldLayout>
+</file>
+
+<file path=ppt/slideLayouts/slideLayout38.xml><?xml version="1.0" encoding="utf-8"?>
+<p:sldLayout xmlns:a="http://schemas.openxmlformats.org/drawingml/2006/main" xmlns:r="http://schemas.openxmlformats.org/officeDocument/2006/relationships" xmlns:p="http://schemas.openxmlformats.org/presentationml/2006/main" userDrawn="1">
+  <p:cSld name="Three Content">
+    <p:spTree>
+      <p:nvGrpSpPr>
+        <p:cNvPr id="1" name=""/>
+        <p:cNvGrpSpPr/>
+        <p:nvPr/>
+      </p:nvGrpSpPr>
+      <p:grpSpPr>
+        <a:xfrm>
+          <a:off x="0" y="0"/>
+          <a:ext cx="0" cy="0"/>
+          <a:chOff x="0" y="0"/>
+          <a:chExt cx="0" cy="0"/>
+        </a:xfrm>
+      </p:grpSpPr>
+      <p:sp>
+        <p:nvSpPr>
+          <p:cNvPr id="12" name="Picture Placeholder 11">
+            <a:extLst>
+              <a:ext uri="{FF2B5EF4-FFF2-40B4-BE49-F238E27FC236}">
+                <a16:creationId xmlns:a16="http://schemas.microsoft.com/office/drawing/2014/main" id="{2F2F0876-DA34-44C2-B05E-66533803FE6E}"/>
+              </a:ext>
+            </a:extLst>
+          </p:cNvPr>
+          <p:cNvSpPr>
+            <a:spLocks noGrp="1"/>
+          </p:cNvSpPr>
+          <p:nvPr>
+            <p:ph type="pic" sz="quarter" idx="14"/>
+          </p:nvPr>
+        </p:nvSpPr>
+        <p:spPr>
+          <a:xfrm>
+            <a:off x="233400" y="246600"/>
+            <a:ext cx="11725200" cy="6364800"/>
+          </a:xfrm>
+        </p:spPr>
+        <p:txBody>
+          <a:bodyPr anchor="ctr" anchorCtr="0"/>
+          <a:lstStyle>
+            <a:lvl1pPr marL="0" indent="0" algn="ctr">
+              <a:buNone/>
+              <a:defRPr/>
+            </a:lvl1pPr>
+          </a:lstStyle>
+          <a:p>
+            <a:r>
+              <a:rPr lang="en-US"/>
+              <a:t>Click icon to add picture</a:t>
+            </a:r>
+            <a:endParaRPr lang="ru-RU"/>
+          </a:p>
+        </p:txBody>
+      </p:sp>
+      <p:sp>
+        <p:nvSpPr>
+          <p:cNvPr id="10" name="Picture Placeholder 9">
+            <a:extLst>
+              <a:ext uri="{FF2B5EF4-FFF2-40B4-BE49-F238E27FC236}">
+                <a16:creationId xmlns:a16="http://schemas.microsoft.com/office/drawing/2014/main" id="{6E352C7E-BCE1-47CD-872E-2935DD89FC28}"/>
+              </a:ext>
+            </a:extLst>
+          </p:cNvPr>
+          <p:cNvSpPr>
+            <a:spLocks noGrp="1"/>
+          </p:cNvSpPr>
+          <p:nvPr>
+            <p:ph type="pic" sz="quarter" idx="13"/>
+          </p:nvPr>
+        </p:nvSpPr>
+        <p:spPr>
+          <a:xfrm>
+            <a:off x="852488" y="2103438"/>
+            <a:ext cx="5243512" cy="3748087"/>
+          </a:xfrm>
+        </p:spPr>
+        <p:txBody>
+          <a:bodyPr anchor="ctr" anchorCtr="0"/>
+          <a:lstStyle>
+            <a:lvl1pPr marL="0" indent="0" algn="ctr">
+              <a:buNone/>
+              <a:defRPr/>
+            </a:lvl1pPr>
+          </a:lstStyle>
+          <a:p>
+            <a:r>
+              <a:rPr lang="en-US"/>
+              <a:t>Click icon to add picture</a:t>
+            </a:r>
+            <a:endParaRPr lang="ru-RU" dirty="0"/>
+          </a:p>
+        </p:txBody>
+      </p:sp>
+      <p:sp>
+        <p:nvSpPr>
+          <p:cNvPr id="8" name="Title 7"/>
+          <p:cNvSpPr>
+            <a:spLocks noGrp="1"/>
+          </p:cNvSpPr>
+          <p:nvPr>
+            <p:ph type="title"/>
+          </p:nvPr>
+        </p:nvSpPr>
+        <p:spPr/>
+        <p:txBody>
+          <a:bodyPr/>
+          <a:lstStyle>
+            <a:lvl1pPr>
+              <a:defRPr>
+                <a:solidFill>
+                  <a:schemeClr val="bg2">
+                    <a:lumMod val="50000"/>
+                  </a:schemeClr>
+                </a:solidFill>
+              </a:defRPr>
+            </a:lvl1pPr>
+          </a:lstStyle>
+          <a:p>
+            <a:r>
+              <a:rPr lang="en-US"/>
+              <a:t>Click to edit Master title style</a:t>
+            </a:r>
+            <a:endParaRPr lang="en-US" dirty="0"/>
+          </a:p>
+        </p:txBody>
+      </p:sp>
+      <p:sp>
+        <p:nvSpPr>
+          <p:cNvPr id="4" name="Content Placeholder 3"/>
+          <p:cNvSpPr>
+            <a:spLocks noGrp="1"/>
+          </p:cNvSpPr>
+          <p:nvPr>
+            <p:ph sz="half" idx="2"/>
+          </p:nvPr>
+        </p:nvSpPr>
+        <p:spPr>
+          <a:xfrm>
+            <a:off x="6461760" y="2103120"/>
+            <a:ext cx="4663440" cy="3749040"/>
+          </a:xfrm>
+        </p:spPr>
+        <p:txBody>
+          <a:bodyPr/>
+          <a:lstStyle>
+            <a:lvl1pPr>
+              <a:defRPr sz="1800"/>
+            </a:lvl1pPr>
+            <a:lvl2pPr>
+              <a:defRPr sz="1600"/>
+            </a:lvl2pPr>
+            <a:lvl3pPr>
+              <a:defRPr sz="1400"/>
+            </a:lvl3pPr>
+            <a:lvl4pPr>
+              <a:defRPr sz="1400"/>
+            </a:lvl4pPr>
+            <a:lvl5pPr>
+              <a:defRPr sz="1400"/>
+            </a:lvl5pPr>
+            <a:lvl6pPr>
+              <a:defRPr sz="1400"/>
+            </a:lvl6pPr>
+            <a:lvl7pPr>
+              <a:defRPr sz="1400"/>
+            </a:lvl7pPr>
+            <a:lvl8pPr>
+              <a:defRPr sz="1400"/>
+            </a:lvl8pPr>
+            <a:lvl9pPr>
+              <a:defRPr sz="1400"/>
+            </a:lvl9pPr>
+          </a:lstStyle>
+          <a:p>
+            <a:pPr lvl="0"/>
+            <a:r>
+              <a:rPr lang="en-US"/>
+              <a:t>Edit Master text styles</a:t>
+            </a:r>
+          </a:p>
+          <a:p>
+            <a:pPr lvl="1"/>
+            <a:r>
+              <a:rPr lang="en-US"/>
+              <a:t>Second level</a:t>
+            </a:r>
+          </a:p>
+          <a:p>
+            <a:pPr lvl="2"/>
+            <a:r>
+              <a:rPr lang="en-US"/>
+              <a:t>Third level</a:t>
+            </a:r>
+          </a:p>
+          <a:p>
+            <a:pPr lvl="3"/>
+            <a:r>
+              <a:rPr lang="en-US"/>
+              <a:t>Fourth level</a:t>
+            </a:r>
+          </a:p>
+          <a:p>
+            <a:pPr lvl="4"/>
+            <a:r>
+              <a:rPr lang="en-US"/>
+              <a:t>Fifth level</a:t>
+            </a:r>
+            <a:endParaRPr lang="en-US" dirty="0"/>
+          </a:p>
+        </p:txBody>
+      </p:sp>
+      <p:sp>
+        <p:nvSpPr>
+          <p:cNvPr id="5" name="Date Placeholder 4"/>
+          <p:cNvSpPr>
+            <a:spLocks noGrp="1"/>
+          </p:cNvSpPr>
+          <p:nvPr>
+            <p:ph type="dt" sz="half" idx="10"/>
+          </p:nvPr>
+        </p:nvSpPr>
+        <p:spPr/>
+        <p:txBody>
+          <a:bodyPr/>
+          <a:lstStyle/>
+          <a:p>
+            <a:fld id="{69186D26-FA5F-4637-B602-B7C2DC34CFD4}" type="datetime1">
+              <a:rPr lang="en-US" smtClean="0"/>
+              <a:t>6/6/2022</a:t>
+            </a:fld>
+            <a:endParaRPr lang="en-US" dirty="0"/>
+          </a:p>
+        </p:txBody>
+      </p:sp>
+      <p:sp>
+        <p:nvSpPr>
+          <p:cNvPr id="6" name="Footer Placeholder 5"/>
+          <p:cNvSpPr>
+            <a:spLocks noGrp="1"/>
+          </p:cNvSpPr>
+          <p:nvPr>
+            <p:ph type="ftr" sz="quarter" idx="11"/>
+          </p:nvPr>
+        </p:nvSpPr>
+        <p:spPr/>
+        <p:txBody>
+          <a:bodyPr/>
+          <a:lstStyle/>
+          <a:p>
+            <a:endParaRPr lang="en-US" dirty="0"/>
+          </a:p>
+        </p:txBody>
+      </p:sp>
+      <p:sp>
+        <p:nvSpPr>
+          <p:cNvPr id="7" name="Slide Number Placeholder 6"/>
+          <p:cNvSpPr>
+            <a:spLocks noGrp="1"/>
+          </p:cNvSpPr>
+          <p:nvPr>
+            <p:ph type="sldNum" sz="quarter" idx="12"/>
+          </p:nvPr>
+        </p:nvSpPr>
+        <p:spPr/>
+        <p:txBody>
+          <a:bodyPr/>
+          <a:lstStyle/>
+          <a:p>
+            <a:fld id="{34B7E4EF-A1BD-40F4-AB7B-04F084DD991D}" type="slidenum">
+              <a:rPr lang="en-US" smtClean="0"/>
+              <a:t>‹#›</a:t>
+            </a:fld>
+            <a:endParaRPr lang="en-US" dirty="0"/>
+          </a:p>
+        </p:txBody>
+      </p:sp>
+    </p:spTree>
+    <p:extLst>
+      <p:ext uri="{BB962C8B-B14F-4D97-AF65-F5344CB8AC3E}">
+        <p14:creationId xmlns:p14="http://schemas.microsoft.com/office/powerpoint/2010/main" val="957196334"/>
       </p:ext>
     </p:extLst>
   </p:cSld>
@@ -11195,6 +14289,7 @@
     <p:sldLayoutId id="2147483685" r:id="rId11"/>
     <p:sldLayoutId id="2147483686" r:id="rId12"/>
     <p:sldLayoutId id="2147483687" r:id="rId13"/>
+    <p:sldLayoutId id="2147483688" r:id="rId14"/>
   </p:sldLayoutIdLst>
   <p:txStyles>
     <p:titleStyle>
@@ -12062,6 +15157,193 @@
     <p:extLst>
       <p:ext uri="{BB962C8B-B14F-4D97-AF65-F5344CB8AC3E}">
         <p14:creationId xmlns:p14="http://schemas.microsoft.com/office/powerpoint/2010/main" val="1386799731"/>
+      </p:ext>
+    </p:extLst>
+  </p:cSld>
+  <p:clrMapOvr>
+    <a:masterClrMapping/>
+  </p:clrMapOvr>
+</p:sld>
+</file>
+
+<file path=ppt/slides/slide4.xml><?xml version="1.0" encoding="utf-8"?>
+<p:sld xmlns:a="http://schemas.openxmlformats.org/drawingml/2006/main" xmlns:r="http://schemas.openxmlformats.org/officeDocument/2006/relationships" xmlns:p="http://schemas.openxmlformats.org/presentationml/2006/main">
+  <p:cSld>
+    <p:spTree>
+      <p:nvGrpSpPr>
+        <p:cNvPr id="1" name=""/>
+        <p:cNvGrpSpPr/>
+        <p:nvPr/>
+      </p:nvGrpSpPr>
+      <p:grpSpPr>
+        <a:xfrm>
+          <a:off x="0" y="0"/>
+          <a:ext cx="0" cy="0"/>
+          <a:chOff x="0" y="0"/>
+          <a:chExt cx="0" cy="0"/>
+        </a:xfrm>
+      </p:grpSpPr>
+      <p:pic>
+        <p:nvPicPr>
+          <p:cNvPr id="6" name="Picture Placeholder 5" descr="People discuss some documents">
+            <a:extLst>
+              <a:ext uri="{FF2B5EF4-FFF2-40B4-BE49-F238E27FC236}">
+                <a16:creationId xmlns:a16="http://schemas.microsoft.com/office/drawing/2014/main" id="{AA3CBDBD-ADA7-4AA5-9091-5AD206DAD37F}"/>
+              </a:ext>
+            </a:extLst>
+          </p:cNvPr>
+          <p:cNvPicPr>
+            <a:picLocks noGrp="1" noChangeAspect="1"/>
+          </p:cNvPicPr>
+          <p:nvPr>
+            <p:ph type="pic" sz="quarter" idx="14"/>
+          </p:nvPr>
+        </p:nvPicPr>
+        <p:blipFill>
+          <a:blip r:embed="rId3">
+            <a:duotone>
+              <a:prstClr val="black"/>
+              <a:schemeClr val="accent1">
+                <a:tint val="45000"/>
+                <a:satMod val="400000"/>
+              </a:schemeClr>
+            </a:duotone>
+            <a:alphaModFix amt="10000"/>
+            <a:extLst>
+              <a:ext uri="{28A0092B-C50C-407E-A947-70E740481C1C}">
+                <a14:useLocalDpi xmlns:a14="http://schemas.microsoft.com/office/drawing/2010/main" val="0"/>
+              </a:ext>
+            </a:extLst>
+          </a:blip>
+          <a:srcRect/>
+          <a:stretch/>
+        </p:blipFill>
+        <p:spPr>
+          <a:xfrm>
+            <a:off x="233400" y="247670"/>
+            <a:ext cx="11725200" cy="6362659"/>
+          </a:xfrm>
+        </p:spPr>
+      </p:pic>
+      <p:sp>
+        <p:nvSpPr>
+          <p:cNvPr id="3" name="Title 2">
+            <a:extLst>
+              <a:ext uri="{FF2B5EF4-FFF2-40B4-BE49-F238E27FC236}">
+                <a16:creationId xmlns:a16="http://schemas.microsoft.com/office/drawing/2014/main" id="{6002F139-264F-4B41-B39A-9E8B2901E164}"/>
+              </a:ext>
+            </a:extLst>
+          </p:cNvPr>
+          <p:cNvSpPr>
+            <a:spLocks noGrp="1"/>
+          </p:cNvSpPr>
+          <p:nvPr>
+            <p:ph type="title"/>
+          </p:nvPr>
+        </p:nvSpPr>
+        <p:spPr/>
+        <p:txBody>
+          <a:bodyPr/>
+          <a:lstStyle/>
+          <a:p>
+            <a:r>
+              <a:rPr lang="en-US" dirty="0"/>
+              <a:t>How does DFS work</a:t>
+            </a:r>
+            <a:endParaRPr lang="en-US" dirty="0">
+              <a:solidFill>
+                <a:schemeClr val="bg2">
+                  <a:lumMod val="50000"/>
+                </a:schemeClr>
+              </a:solidFill>
+            </a:endParaRPr>
+          </a:p>
+        </p:txBody>
+      </p:sp>
+      <p:graphicFrame>
+        <p:nvGraphicFramePr>
+          <p:cNvPr id="13" name="Content Placeholder 14" descr="SmartArt object">
+            <a:extLst>
+              <a:ext uri="{FF2B5EF4-FFF2-40B4-BE49-F238E27FC236}">
+                <a16:creationId xmlns:a16="http://schemas.microsoft.com/office/drawing/2014/main" id="{DDF6050D-62DF-4914-93B9-C337839FF3BD}"/>
+              </a:ext>
+            </a:extLst>
+          </p:cNvPr>
+          <p:cNvGraphicFramePr>
+            <a:graphicFrameLocks noGrp="1"/>
+          </p:cNvGraphicFramePr>
+          <p:nvPr>
+            <p:ph sz="half" idx="2"/>
+          </p:nvPr>
+        </p:nvGraphicFramePr>
+        <p:xfrm>
+          <a:off x="6461125" y="2103438"/>
+          <a:ext cx="4664075" cy="3748087"/>
+        </p:xfrm>
+        <a:graphic>
+          <a:graphicData uri="http://schemas.openxmlformats.org/drawingml/2006/diagram">
+            <dgm:relIds xmlns:dgm="http://schemas.openxmlformats.org/drawingml/2006/diagram" xmlns:r="http://schemas.openxmlformats.org/officeDocument/2006/relationships" r:dm="rId4" r:lo="rId5" r:qs="rId6" r:cs="rId7"/>
+          </a:graphicData>
+        </a:graphic>
+      </p:graphicFrame>
+      <p:sp>
+        <p:nvSpPr>
+          <p:cNvPr id="2" name="Picture Placeholder 1"/>
+          <p:cNvSpPr>
+            <a:spLocks noGrp="1"/>
+          </p:cNvSpPr>
+          <p:nvPr>
+            <p:ph type="pic" sz="quarter" idx="13"/>
+          </p:nvPr>
+        </p:nvSpPr>
+        <p:spPr/>
+      </p:sp>
+      <p:pic>
+        <p:nvPicPr>
+          <p:cNvPr id="7" name="Picture Placeholder 5" descr="Man shows something on the laptop">
+            <a:extLst>
+              <a:ext uri="{FF2B5EF4-FFF2-40B4-BE49-F238E27FC236}">
+                <a16:creationId xmlns:a16="http://schemas.microsoft.com/office/drawing/2014/main" id="{CCB0035C-155F-4A5B-87BE-89762733C8E1}"/>
+              </a:ext>
+            </a:extLst>
+          </p:cNvPr>
+          <p:cNvPicPr>
+            <a:picLocks/>
+          </p:cNvPicPr>
+          <p:nvPr/>
+        </p:nvPicPr>
+        <p:blipFill>
+          <a:blip r:embed="rId9">
+            <a:duotone>
+              <a:prstClr val="black"/>
+              <a:schemeClr val="accent1">
+                <a:tint val="45000"/>
+                <a:satMod val="400000"/>
+              </a:schemeClr>
+            </a:duotone>
+            <a:extLst>
+              <a:ext uri="{28A0092B-C50C-407E-A947-70E740481C1C}">
+                <a14:useLocalDpi xmlns:a14="http://schemas.microsoft.com/office/drawing/2010/main" val="0"/>
+              </a:ext>
+            </a:extLst>
+          </a:blip>
+          <a:srcRect/>
+          <a:stretch/>
+        </p:blipFill>
+        <p:spPr>
+          <a:xfrm>
+            <a:off x="852488" y="2103438"/>
+            <a:ext cx="5243512" cy="3748088"/>
+          </a:xfrm>
+          <a:prstGeom prst="rect">
+            <a:avLst/>
+          </a:prstGeom>
+        </p:spPr>
+      </p:pic>
+    </p:spTree>
+    <p:extLst>
+      <p:ext uri="{BB962C8B-B14F-4D97-AF65-F5344CB8AC3E}">
+        <p14:creationId xmlns:p14="http://schemas.microsoft.com/office/powerpoint/2010/main" val="912618888"/>
       </p:ext>
     </p:extLst>
   </p:cSld>

</xml_diff>